<commit_message>
updating the presa 11-23-24
</commit_message>
<xml_diff>
--- a/преза на 11-23-24.pptx
+++ b/преза на 11-23-24.pptx
@@ -5,7 +5,7 @@
     <p:sldMasterId id="2147483648" r:id="rId1"/>
   </p:sldMasterIdLst>
   <p:notesMasterIdLst>
-    <p:notesMasterId r:id="rId28"/>
+    <p:notesMasterId r:id="rId30"/>
   </p:notesMasterIdLst>
   <p:sldIdLst>
     <p:sldId id="256" r:id="rId2"/>
@@ -24,16 +24,18 @@
     <p:sldId id="274" r:id="rId15"/>
     <p:sldId id="275" r:id="rId16"/>
     <p:sldId id="276" r:id="rId17"/>
-    <p:sldId id="277" r:id="rId18"/>
-    <p:sldId id="278" r:id="rId19"/>
-    <p:sldId id="279" r:id="rId20"/>
-    <p:sldId id="280" r:id="rId21"/>
-    <p:sldId id="281" r:id="rId22"/>
-    <p:sldId id="282" r:id="rId23"/>
-    <p:sldId id="283" r:id="rId24"/>
-    <p:sldId id="265" r:id="rId25"/>
-    <p:sldId id="266" r:id="rId26"/>
-    <p:sldId id="269" r:id="rId27"/>
+    <p:sldId id="284" r:id="rId18"/>
+    <p:sldId id="277" r:id="rId19"/>
+    <p:sldId id="278" r:id="rId20"/>
+    <p:sldId id="279" r:id="rId21"/>
+    <p:sldId id="285" r:id="rId22"/>
+    <p:sldId id="280" r:id="rId23"/>
+    <p:sldId id="281" r:id="rId24"/>
+    <p:sldId id="282" r:id="rId25"/>
+    <p:sldId id="283" r:id="rId26"/>
+    <p:sldId id="265" r:id="rId27"/>
+    <p:sldId id="266" r:id="rId28"/>
+    <p:sldId id="269" r:id="rId29"/>
   </p:sldIdLst>
   <p:sldSz cx="12192000" cy="6858000"/>
   <p:notesSz cx="6858000" cy="9144000"/>
@@ -233,7 +235,7 @@
           <a:p>
             <a:fld id="{EC666E22-932D-4629-9344-1E81FC6BC210}" type="datetimeFigureOut">
               <a:rPr lang="ru-RU" smtClean="0"/>
-              <a:t>23.11.2024</a:t>
+              <a:t>30.11.2024</a:t>
             </a:fld>
             <a:endParaRPr lang="ru-RU"/>
           </a:p>
@@ -902,7 +904,7 @@
           <a:p>
             <a:fld id="{679EEA19-C3D5-4F80-9804-B343D56E977A}" type="slidenum">
               <a:rPr lang="ru-RU" smtClean="0"/>
-              <a:t>17</a:t>
+              <a:t>18</a:t>
             </a:fld>
             <a:endParaRPr lang="ru-RU"/>
           </a:p>
@@ -986,7 +988,7 @@
           <a:p>
             <a:fld id="{679EEA19-C3D5-4F80-9804-B343D56E977A}" type="slidenum">
               <a:rPr lang="ru-RU" smtClean="0"/>
-              <a:t>18</a:t>
+              <a:t>19</a:t>
             </a:fld>
             <a:endParaRPr lang="ru-RU"/>
           </a:p>
@@ -1070,7 +1072,7 @@
           <a:p>
             <a:fld id="{679EEA19-C3D5-4F80-9804-B343D56E977A}" type="slidenum">
               <a:rPr lang="ru-RU" smtClean="0"/>
-              <a:t>19</a:t>
+              <a:t>20</a:t>
             </a:fld>
             <a:endParaRPr lang="ru-RU"/>
           </a:p>
@@ -1154,7 +1156,7 @@
           <a:p>
             <a:fld id="{679EEA19-C3D5-4F80-9804-B343D56E977A}" type="slidenum">
               <a:rPr lang="ru-RU" smtClean="0"/>
-              <a:t>20</a:t>
+              <a:t>22</a:t>
             </a:fld>
             <a:endParaRPr lang="ru-RU"/>
           </a:p>
@@ -1238,7 +1240,7 @@
           <a:p>
             <a:fld id="{679EEA19-C3D5-4F80-9804-B343D56E977A}" type="slidenum">
               <a:rPr lang="ru-RU" smtClean="0"/>
-              <a:t>21</a:t>
+              <a:t>23</a:t>
             </a:fld>
             <a:endParaRPr lang="ru-RU"/>
           </a:p>
@@ -1322,7 +1324,7 @@
           <a:p>
             <a:fld id="{679EEA19-C3D5-4F80-9804-B343D56E977A}" type="slidenum">
               <a:rPr lang="ru-RU" smtClean="0"/>
-              <a:t>22</a:t>
+              <a:t>24</a:t>
             </a:fld>
             <a:endParaRPr lang="ru-RU"/>
           </a:p>
@@ -1406,7 +1408,7 @@
           <a:p>
             <a:fld id="{679EEA19-C3D5-4F80-9804-B343D56E977A}" type="slidenum">
               <a:rPr lang="ru-RU" smtClean="0"/>
-              <a:t>23</a:t>
+              <a:t>25</a:t>
             </a:fld>
             <a:endParaRPr lang="ru-RU"/>
           </a:p>
@@ -1574,7 +1576,7 @@
           <a:p>
             <a:fld id="{9D55945D-F44B-485A-BBFA-7D2FD5502600}" type="slidenum">
               <a:rPr lang="ru-RU" smtClean="0"/>
-              <a:t>24</a:t>
+              <a:t>26</a:t>
             </a:fld>
             <a:endParaRPr lang="ru-RU"/>
           </a:p>
@@ -1658,7 +1660,7 @@
           <a:p>
             <a:fld id="{9D55945D-F44B-485A-BBFA-7D2FD5502600}" type="slidenum">
               <a:rPr lang="ru-RU" smtClean="0"/>
-              <a:t>25</a:t>
+              <a:t>27</a:t>
             </a:fld>
             <a:endParaRPr lang="ru-RU"/>
           </a:p>
@@ -2396,7 +2398,7 @@
           <a:p>
             <a:fld id="{6BDCC675-8E36-47AD-B22E-92B4CF1E7536}" type="datetimeFigureOut">
               <a:rPr lang="ru-RU" smtClean="0"/>
-              <a:t>23.11.2024</a:t>
+              <a:t>30.11.2024</a:t>
             </a:fld>
             <a:endParaRPr lang="ru-RU"/>
           </a:p>
@@ -2566,7 +2568,7 @@
           <a:p>
             <a:fld id="{6BDCC675-8E36-47AD-B22E-92B4CF1E7536}" type="datetimeFigureOut">
               <a:rPr lang="ru-RU" smtClean="0"/>
-              <a:t>23.11.2024</a:t>
+              <a:t>30.11.2024</a:t>
             </a:fld>
             <a:endParaRPr lang="ru-RU"/>
           </a:p>
@@ -2746,7 +2748,7 @@
           <a:p>
             <a:fld id="{6BDCC675-8E36-47AD-B22E-92B4CF1E7536}" type="datetimeFigureOut">
               <a:rPr lang="ru-RU" smtClean="0"/>
-              <a:t>23.11.2024</a:t>
+              <a:t>30.11.2024</a:t>
             </a:fld>
             <a:endParaRPr lang="ru-RU"/>
           </a:p>
@@ -2916,7 +2918,7 @@
           <a:p>
             <a:fld id="{6BDCC675-8E36-47AD-B22E-92B4CF1E7536}" type="datetimeFigureOut">
               <a:rPr lang="ru-RU" smtClean="0"/>
-              <a:t>23.11.2024</a:t>
+              <a:t>30.11.2024</a:t>
             </a:fld>
             <a:endParaRPr lang="ru-RU"/>
           </a:p>
@@ -3162,7 +3164,7 @@
           <a:p>
             <a:fld id="{6BDCC675-8E36-47AD-B22E-92B4CF1E7536}" type="datetimeFigureOut">
               <a:rPr lang="ru-RU" smtClean="0"/>
-              <a:t>23.11.2024</a:t>
+              <a:t>30.11.2024</a:t>
             </a:fld>
             <a:endParaRPr lang="ru-RU"/>
           </a:p>
@@ -3394,7 +3396,7 @@
           <a:p>
             <a:fld id="{6BDCC675-8E36-47AD-B22E-92B4CF1E7536}" type="datetimeFigureOut">
               <a:rPr lang="ru-RU" smtClean="0"/>
-              <a:t>23.11.2024</a:t>
+              <a:t>30.11.2024</a:t>
             </a:fld>
             <a:endParaRPr lang="ru-RU"/>
           </a:p>
@@ -3761,7 +3763,7 @@
           <a:p>
             <a:fld id="{6BDCC675-8E36-47AD-B22E-92B4CF1E7536}" type="datetimeFigureOut">
               <a:rPr lang="ru-RU" smtClean="0"/>
-              <a:t>23.11.2024</a:t>
+              <a:t>30.11.2024</a:t>
             </a:fld>
             <a:endParaRPr lang="ru-RU"/>
           </a:p>
@@ -3879,7 +3881,7 @@
           <a:p>
             <a:fld id="{6BDCC675-8E36-47AD-B22E-92B4CF1E7536}" type="datetimeFigureOut">
               <a:rPr lang="ru-RU" smtClean="0"/>
-              <a:t>23.11.2024</a:t>
+              <a:t>30.11.2024</a:t>
             </a:fld>
             <a:endParaRPr lang="ru-RU"/>
           </a:p>
@@ -3974,7 +3976,7 @@
           <a:p>
             <a:fld id="{6BDCC675-8E36-47AD-B22E-92B4CF1E7536}" type="datetimeFigureOut">
               <a:rPr lang="ru-RU" smtClean="0"/>
-              <a:t>23.11.2024</a:t>
+              <a:t>30.11.2024</a:t>
             </a:fld>
             <a:endParaRPr lang="ru-RU"/>
           </a:p>
@@ -4251,7 +4253,7 @@
           <a:p>
             <a:fld id="{6BDCC675-8E36-47AD-B22E-92B4CF1E7536}" type="datetimeFigureOut">
               <a:rPr lang="ru-RU" smtClean="0"/>
-              <a:t>23.11.2024</a:t>
+              <a:t>30.11.2024</a:t>
             </a:fld>
             <a:endParaRPr lang="ru-RU"/>
           </a:p>
@@ -4504,7 +4506,7 @@
           <a:p>
             <a:fld id="{6BDCC675-8E36-47AD-B22E-92B4CF1E7536}" type="datetimeFigureOut">
               <a:rPr lang="ru-RU" smtClean="0"/>
-              <a:t>23.11.2024</a:t>
+              <a:t>30.11.2024</a:t>
             </a:fld>
             <a:endParaRPr lang="ru-RU"/>
           </a:p>
@@ -4717,7 +4719,7 @@
           <a:p>
             <a:fld id="{6BDCC675-8E36-47AD-B22E-92B4CF1E7536}" type="datetimeFigureOut">
               <a:rPr lang="ru-RU" smtClean="0"/>
-              <a:t>23.11.2024</a:t>
+              <a:t>30.11.2024</a:t>
             </a:fld>
             <a:endParaRPr lang="ru-RU"/>
           </a:p>
@@ -7886,6 +7888,42 @@
           </a:prstGeom>
         </p:spPr>
       </p:pic>
+      <p:sp>
+        <p:nvSpPr>
+          <p:cNvPr id="3" name="Прямоугольник 2"/>
+          <p:cNvSpPr/>
+          <p:nvPr/>
+        </p:nvSpPr>
+        <p:spPr>
+          <a:xfrm>
+            <a:off x="123825" y="1324660"/>
+            <a:ext cx="2533650" cy="646331"/>
+          </a:xfrm>
+          <a:prstGeom prst="rect">
+            <a:avLst/>
+          </a:prstGeom>
+        </p:spPr>
+        <p:txBody>
+          <a:bodyPr wrap="square">
+            <a:spAutoFit/>
+          </a:bodyPr>
+          <a:lstStyle/>
+          <a:p>
+            <a:r>
+              <a:rPr lang="ru-RU" dirty="0" smtClean="0"/>
+              <a:t>Создаем папку</a:t>
+            </a:r>
+            <a:br>
+              <a:rPr lang="ru-RU" dirty="0" smtClean="0"/>
+            </a:br>
+            <a:r>
+              <a:rPr lang="ru-RU" dirty="0" smtClean="0"/>
+              <a:t>!Не на рабочем столе!</a:t>
+            </a:r>
+            <a:endParaRPr lang="ru-RU" dirty="0"/>
+          </a:p>
+        </p:txBody>
+      </p:sp>
     </p:spTree>
     <p:extLst>
       <p:ext uri="{BB962C8B-B14F-4D97-AF65-F5344CB8AC3E}">
@@ -7970,6 +8008,71 @@
           </a:prstGeom>
         </p:spPr>
       </p:pic>
+      <p:sp>
+        <p:nvSpPr>
+          <p:cNvPr id="5" name="Прямоугольник 4"/>
+          <p:cNvSpPr/>
+          <p:nvPr/>
+        </p:nvSpPr>
+        <p:spPr>
+          <a:xfrm>
+            <a:off x="9616967" y="2172385"/>
+            <a:ext cx="2533650" cy="923330"/>
+          </a:xfrm>
+          <a:prstGeom prst="rect">
+            <a:avLst/>
+          </a:prstGeom>
+        </p:spPr>
+        <p:txBody>
+          <a:bodyPr wrap="square">
+            <a:spAutoFit/>
+          </a:bodyPr>
+          <a:lstStyle/>
+          <a:p>
+            <a:r>
+              <a:rPr lang="ru-RU" dirty="0" smtClean="0"/>
+              <a:t>Заходим на</a:t>
+            </a:r>
+            <a:r>
+              <a:rPr lang="en-US" dirty="0"/>
+              <a:t> </a:t>
+            </a:r>
+            <a:r>
+              <a:rPr lang="en-US" dirty="0" err="1" smtClean="0"/>
+              <a:t>github</a:t>
+            </a:r>
+            <a:r>
+              <a:rPr lang="ru-RU" dirty="0"/>
+              <a:t> </a:t>
+            </a:r>
+            <a:r>
+              <a:rPr lang="ru-RU" dirty="0" smtClean="0"/>
+              <a:t>в раздел </a:t>
+            </a:r>
+            <a:r>
+              <a:rPr lang="en-US" dirty="0"/>
+              <a:t>R</a:t>
+            </a:r>
+            <a:r>
+              <a:rPr lang="en-US" dirty="0" smtClean="0"/>
+              <a:t>epositories </a:t>
+            </a:r>
+            <a:r>
+              <a:rPr lang="ru-RU" dirty="0" smtClean="0"/>
+              <a:t>и нажимаем кнопку </a:t>
+            </a:r>
+            <a:r>
+              <a:rPr lang="en-US" dirty="0"/>
+              <a:t>N</a:t>
+            </a:r>
+            <a:r>
+              <a:rPr lang="en-US" dirty="0" smtClean="0"/>
+              <a:t>ew</a:t>
+            </a:r>
+            <a:endParaRPr lang="ru-RU" dirty="0"/>
+          </a:p>
+        </p:txBody>
+      </p:sp>
     </p:spTree>
     <p:extLst>
       <p:ext uri="{BB962C8B-B14F-4D97-AF65-F5344CB8AC3E}">
@@ -8023,7 +8126,7 @@
         </p:blipFill>
         <p:spPr>
           <a:xfrm>
-            <a:off x="1070182" y="138621"/>
+            <a:off x="1622632" y="119571"/>
             <a:ext cx="9897856" cy="2124371"/>
           </a:xfrm>
           <a:prstGeom prst="rect">
@@ -8047,7 +8150,7 @@
         </p:blipFill>
         <p:spPr>
           <a:xfrm>
-            <a:off x="2050118" y="2384656"/>
+            <a:off x="2991833" y="2369990"/>
             <a:ext cx="8091764" cy="4353873"/>
           </a:xfrm>
           <a:prstGeom prst="rect">
@@ -8055,6 +8158,109 @@
           </a:prstGeom>
         </p:spPr>
       </p:pic>
+      <p:sp>
+        <p:nvSpPr>
+          <p:cNvPr id="4" name="Прямоугольник 3"/>
+          <p:cNvSpPr/>
+          <p:nvPr/>
+        </p:nvSpPr>
+        <p:spPr>
+          <a:xfrm>
+            <a:off x="31957" y="275641"/>
+            <a:ext cx="2533650" cy="3416320"/>
+          </a:xfrm>
+          <a:prstGeom prst="rect">
+            <a:avLst/>
+          </a:prstGeom>
+        </p:spPr>
+        <p:txBody>
+          <a:bodyPr wrap="square">
+            <a:spAutoFit/>
+          </a:bodyPr>
+          <a:lstStyle/>
+          <a:p>
+            <a:r>
+              <a:rPr lang="ru-RU" dirty="0" smtClean="0"/>
+              <a:t>Заполняем необходимые поля (главное название и тип доступа: публичный/приватный)</a:t>
+            </a:r>
+            <a:br>
+              <a:rPr lang="ru-RU" dirty="0" smtClean="0"/>
+            </a:br>
+            <a:r>
+              <a:rPr lang="ru-RU" dirty="0" smtClean="0"/>
+              <a:t>Сейчас делаем тип доступа </a:t>
+            </a:r>
+            <a:r>
+              <a:rPr lang="en-US" dirty="0" smtClean="0"/>
+              <a:t>public </a:t>
+            </a:r>
+            <a:r>
+              <a:rPr lang="ru-RU" dirty="0" smtClean="0"/>
+              <a:t/>
+            </a:r>
+            <a:br>
+              <a:rPr lang="ru-RU" dirty="0" smtClean="0"/>
+            </a:br>
+            <a:r>
+              <a:rPr lang="ru-RU" dirty="0" smtClean="0"/>
+              <a:t>Лучше добавить файл </a:t>
+            </a:r>
+            <a:r>
+              <a:rPr lang="en-US" dirty="0" smtClean="0"/>
+              <a:t>README – </a:t>
+            </a:r>
+            <a:r>
+              <a:rPr lang="ru-RU" dirty="0" smtClean="0"/>
+              <a:t>описание к проекту</a:t>
+            </a:r>
+            <a:br>
+              <a:rPr lang="ru-RU" dirty="0" smtClean="0"/>
+            </a:br>
+            <a:r>
+              <a:rPr lang="ru-RU" dirty="0" smtClean="0"/>
+              <a:t>Нажимаем </a:t>
+            </a:r>
+            <a:r>
+              <a:rPr lang="en-US" dirty="0" err="1" smtClean="0"/>
+              <a:t>Creat</a:t>
+            </a:r>
+            <a:r>
+              <a:rPr lang="en-US" dirty="0" smtClean="0"/>
+              <a:t> repository</a:t>
+            </a:r>
+            <a:endParaRPr lang="ru-RU" dirty="0"/>
+          </a:p>
+        </p:txBody>
+      </p:sp>
+      <p:sp>
+        <p:nvSpPr>
+          <p:cNvPr id="6" name="Прямоугольник 5"/>
+          <p:cNvSpPr/>
+          <p:nvPr/>
+        </p:nvSpPr>
+        <p:spPr>
+          <a:xfrm>
+            <a:off x="0" y="4223760"/>
+            <a:ext cx="2533650" cy="923330"/>
+          </a:xfrm>
+          <a:prstGeom prst="rect">
+            <a:avLst/>
+          </a:prstGeom>
+        </p:spPr>
+        <p:txBody>
+          <a:bodyPr wrap="square">
+            <a:spAutoFit/>
+          </a:bodyPr>
+          <a:lstStyle/>
+          <a:p>
+            <a:r>
+              <a:rPr lang="ru-RU" dirty="0" smtClean="0"/>
+              <a:t>Вот такое должно открыться после создания</a:t>
+            </a:r>
+            <a:endParaRPr lang="ru-RU" dirty="0"/>
+          </a:p>
+        </p:txBody>
+      </p:sp>
     </p:spTree>
     <p:extLst>
       <p:ext uri="{BB962C8B-B14F-4D97-AF65-F5344CB8AC3E}">
@@ -8118,7 +8324,7 @@
       </p:pic>
       <p:pic>
         <p:nvPicPr>
-          <p:cNvPr id="6" name="Рисунок 5"/>
+          <p:cNvPr id="8" name="Рисунок 7"/>
           <p:cNvPicPr>
             <a:picLocks noChangeAspect="1"/>
           </p:cNvPicPr>
@@ -8126,54 +8332,6 @@
         </p:nvPicPr>
         <p:blipFill>
           <a:blip r:embed="rId4"/>
-          <a:stretch>
-            <a:fillRect/>
-          </a:stretch>
-        </p:blipFill>
-        <p:spPr>
-          <a:xfrm>
-            <a:off x="73572" y="3807859"/>
-            <a:ext cx="6381016" cy="1379411"/>
-          </a:xfrm>
-          <a:prstGeom prst="rect">
-            <a:avLst/>
-          </a:prstGeom>
-        </p:spPr>
-      </p:pic>
-      <p:pic>
-        <p:nvPicPr>
-          <p:cNvPr id="7" name="Рисунок 6"/>
-          <p:cNvPicPr>
-            <a:picLocks noChangeAspect="1"/>
-          </p:cNvPicPr>
-          <p:nvPr/>
-        </p:nvPicPr>
-        <p:blipFill>
-          <a:blip r:embed="rId5"/>
-          <a:stretch>
-            <a:fillRect/>
-          </a:stretch>
-        </p:blipFill>
-        <p:spPr>
-          <a:xfrm>
-            <a:off x="46781" y="5390945"/>
-            <a:ext cx="6049219" cy="1467055"/>
-          </a:xfrm>
-          <a:prstGeom prst="rect">
-            <a:avLst/>
-          </a:prstGeom>
-        </p:spPr>
-      </p:pic>
-      <p:pic>
-        <p:nvPicPr>
-          <p:cNvPr id="8" name="Рисунок 7"/>
-          <p:cNvPicPr>
-            <a:picLocks noChangeAspect="1"/>
-          </p:cNvPicPr>
-          <p:nvPr/>
-        </p:nvPicPr>
-        <p:blipFill>
-          <a:blip r:embed="rId6"/>
           <a:stretch>
             <a:fillRect/>
           </a:stretch>
@@ -8188,29 +8346,96 @@
           </a:prstGeom>
         </p:spPr>
       </p:pic>
-      <p:pic>
-        <p:nvPicPr>
-          <p:cNvPr id="9" name="Рисунок 8"/>
-          <p:cNvPicPr>
-            <a:picLocks noChangeAspect="1"/>
-          </p:cNvPicPr>
+      <p:sp>
+        <p:nvSpPr>
+          <p:cNvPr id="11" name="Прямоугольник 10"/>
+          <p:cNvSpPr/>
           <p:nvPr/>
-        </p:nvPicPr>
-        <p:blipFill rotWithShape="1">
-          <a:blip r:embed="rId7"/>
-          <a:srcRect l="14683" r="11472"/>
-          <a:stretch/>
-        </p:blipFill>
+        </p:nvSpPr>
         <p:spPr>
           <a:xfrm>
-            <a:off x="6602509" y="4702704"/>
-            <a:ext cx="5318234" cy="1876687"/>
+            <a:off x="647699" y="4833360"/>
+            <a:ext cx="2886075" cy="923330"/>
           </a:xfrm>
           <a:prstGeom prst="rect">
             <a:avLst/>
           </a:prstGeom>
         </p:spPr>
-      </p:pic>
+        <p:txBody>
+          <a:bodyPr wrap="square">
+            <a:spAutoFit/>
+          </a:bodyPr>
+          <a:lstStyle/>
+          <a:p>
+            <a:r>
+              <a:rPr lang="ru-RU" dirty="0" smtClean="0"/>
+              <a:t>Нажимаем на кнопочку </a:t>
+            </a:r>
+            <a:r>
+              <a:rPr lang="en-US" dirty="0" smtClean="0"/>
+              <a:t>Code </a:t>
+            </a:r>
+            <a:r>
+              <a:rPr lang="ru-RU" dirty="0" smtClean="0"/>
+              <a:t>и копируем </a:t>
+            </a:r>
+            <a:r>
+              <a:rPr lang="en-US" dirty="0" smtClean="0"/>
+              <a:t>https </a:t>
+            </a:r>
+            <a:r>
+              <a:rPr lang="ru-RU" dirty="0" smtClean="0"/>
+              <a:t>адрес своего </a:t>
+            </a:r>
+            <a:r>
+              <a:rPr lang="ru-RU" dirty="0" err="1" smtClean="0"/>
+              <a:t>репозитория</a:t>
+            </a:r>
+            <a:endParaRPr lang="ru-RU" dirty="0"/>
+          </a:p>
+        </p:txBody>
+      </p:sp>
+      <p:sp>
+        <p:nvSpPr>
+          <p:cNvPr id="12" name="Прямоугольник 11"/>
+          <p:cNvSpPr/>
+          <p:nvPr/>
+        </p:nvSpPr>
+        <p:spPr>
+          <a:xfrm>
+            <a:off x="6724649" y="4833360"/>
+            <a:ext cx="2886075" cy="923330"/>
+          </a:xfrm>
+          <a:prstGeom prst="rect">
+            <a:avLst/>
+          </a:prstGeom>
+        </p:spPr>
+        <p:txBody>
+          <a:bodyPr wrap="square">
+            <a:spAutoFit/>
+          </a:bodyPr>
+          <a:lstStyle/>
+          <a:p>
+            <a:r>
+              <a:rPr lang="ru-RU" dirty="0" smtClean="0"/>
+              <a:t>Далее зажимаем правую кнопку мышки и выбираем </a:t>
+            </a:r>
+            <a:r>
+              <a:rPr lang="en-US" dirty="0" smtClean="0"/>
+              <a:t>Open </a:t>
+            </a:r>
+            <a:r>
+              <a:rPr lang="en-US" dirty="0" err="1" smtClean="0"/>
+              <a:t>Git</a:t>
+            </a:r>
+            <a:r>
+              <a:rPr lang="en-US" dirty="0" smtClean="0"/>
+              <a:t> Bash here</a:t>
+            </a:r>
+            <a:endParaRPr lang="ru-RU" dirty="0"/>
+          </a:p>
+        </p:txBody>
+      </p:sp>
     </p:spTree>
     <p:extLst>
       <p:ext uri="{BB962C8B-B14F-4D97-AF65-F5344CB8AC3E}">
@@ -8256,6 +8481,29 @@
           </p:cNvPicPr>
           <p:nvPr/>
         </p:nvPicPr>
+        <p:blipFill rotWithShape="1">
+          <a:blip r:embed="rId2"/>
+          <a:srcRect l="14683" r="11472"/>
+          <a:stretch/>
+        </p:blipFill>
+        <p:spPr>
+          <a:xfrm>
+            <a:off x="531391" y="4899500"/>
+            <a:ext cx="5318234" cy="1876687"/>
+          </a:xfrm>
+          <a:prstGeom prst="rect">
+            <a:avLst/>
+          </a:prstGeom>
+        </p:spPr>
+      </p:pic>
+      <p:pic>
+        <p:nvPicPr>
+          <p:cNvPr id="3" name="Рисунок 2"/>
+          <p:cNvPicPr>
+            <a:picLocks noChangeAspect="1"/>
+          </p:cNvPicPr>
+          <p:nvPr/>
+        </p:nvPicPr>
         <p:blipFill>
           <a:blip r:embed="rId3"/>
           <a:stretch>
@@ -8264,14 +8512,628 @@
         </p:blipFill>
         <p:spPr>
           <a:xfrm>
-            <a:off x="830933" y="744385"/>
-            <a:ext cx="10863898" cy="5442256"/>
+            <a:off x="0" y="829566"/>
+            <a:ext cx="6381016" cy="1379411"/>
           </a:xfrm>
           <a:prstGeom prst="rect">
             <a:avLst/>
           </a:prstGeom>
         </p:spPr>
       </p:pic>
+      <p:pic>
+        <p:nvPicPr>
+          <p:cNvPr id="4" name="Рисунок 3"/>
+          <p:cNvPicPr>
+            <a:picLocks noChangeAspect="1"/>
+          </p:cNvPicPr>
+          <p:nvPr/>
+        </p:nvPicPr>
+        <p:blipFill>
+          <a:blip r:embed="rId4"/>
+          <a:stretch>
+            <a:fillRect/>
+          </a:stretch>
+        </p:blipFill>
+        <p:spPr>
+          <a:xfrm>
+            <a:off x="165898" y="3076603"/>
+            <a:ext cx="6049219" cy="1467055"/>
+          </a:xfrm>
+          <a:prstGeom prst="rect">
+            <a:avLst/>
+          </a:prstGeom>
+        </p:spPr>
+      </p:pic>
+      <p:sp>
+        <p:nvSpPr>
+          <p:cNvPr id="5" name="Прямоугольник 4"/>
+          <p:cNvSpPr/>
+          <p:nvPr/>
+        </p:nvSpPr>
+        <p:spPr>
+          <a:xfrm>
+            <a:off x="6509970" y="233317"/>
+            <a:ext cx="2886075" cy="1477328"/>
+          </a:xfrm>
+          <a:prstGeom prst="rect">
+            <a:avLst/>
+          </a:prstGeom>
+        </p:spPr>
+        <p:txBody>
+          <a:bodyPr wrap="square">
+            <a:spAutoFit/>
+          </a:bodyPr>
+          <a:lstStyle/>
+          <a:p>
+            <a:r>
+              <a:rPr lang="ru-RU" dirty="0" smtClean="0"/>
+              <a:t>Для клонирования удаленного </a:t>
+            </a:r>
+            <a:r>
+              <a:rPr lang="ru-RU" dirty="0" err="1" smtClean="0"/>
+              <a:t>репозитория</a:t>
+            </a:r>
+            <a:r>
+              <a:rPr lang="ru-RU" dirty="0" smtClean="0"/>
+              <a:t> на локальный компьютер используем команду </a:t>
+            </a:r>
+            <a:r>
+              <a:rPr lang="en-US" dirty="0" err="1" smtClean="0"/>
+              <a:t>git</a:t>
+            </a:r>
+            <a:r>
+              <a:rPr lang="en-US" dirty="0" smtClean="0"/>
+              <a:t> clone</a:t>
+            </a:r>
+            <a:endParaRPr lang="ru-RU" dirty="0"/>
+          </a:p>
+        </p:txBody>
+      </p:sp>
+      <p:sp>
+        <p:nvSpPr>
+          <p:cNvPr id="6" name="Прямоугольник 5"/>
+          <p:cNvSpPr/>
+          <p:nvPr/>
+        </p:nvSpPr>
+        <p:spPr>
+          <a:xfrm>
+            <a:off x="9305925" y="233317"/>
+            <a:ext cx="2886075" cy="2862322"/>
+          </a:xfrm>
+          <a:prstGeom prst="rect">
+            <a:avLst/>
+          </a:prstGeom>
+        </p:spPr>
+        <p:txBody>
+          <a:bodyPr wrap="square">
+            <a:spAutoFit/>
+          </a:bodyPr>
+          <a:lstStyle/>
+          <a:p>
+            <a:r>
+              <a:rPr lang="ru-RU" dirty="0" smtClean="0"/>
+              <a:t>ч/з пробел вставляем ссылку на </a:t>
+            </a:r>
+            <a:r>
+              <a:rPr lang="ru-RU" dirty="0" err="1" smtClean="0"/>
+              <a:t>репозиторий</a:t>
+            </a:r>
+            <a:r>
+              <a:rPr lang="ru-RU" dirty="0" smtClean="0"/>
+              <a:t>. Гит баш не любит комбинацию клавиш, поэтому правой кнопкой мыши+</a:t>
+            </a:r>
+            <a:r>
+              <a:rPr lang="en-US" dirty="0" smtClean="0"/>
+              <a:t>Paste.</a:t>
+            </a:r>
+            <a:br>
+              <a:rPr lang="en-US" dirty="0" smtClean="0"/>
+            </a:br>
+            <a:r>
+              <a:rPr lang="ru-RU" dirty="0" smtClean="0"/>
+              <a:t>Убедитесь, что во вставленной ссылке нет никаких лишних водяных знаков и символов, кроме символов из самой ссылки</a:t>
+            </a:r>
+            <a:endParaRPr lang="ru-RU" dirty="0"/>
+          </a:p>
+        </p:txBody>
+      </p:sp>
+      <p:sp>
+        <p:nvSpPr>
+          <p:cNvPr id="7" name="Прямоугольник 6"/>
+          <p:cNvSpPr/>
+          <p:nvPr/>
+        </p:nvSpPr>
+        <p:spPr>
+          <a:xfrm>
+            <a:off x="6238430" y="2672315"/>
+            <a:ext cx="3210081" cy="1477328"/>
+          </a:xfrm>
+          <a:prstGeom prst="rect">
+            <a:avLst/>
+          </a:prstGeom>
+        </p:spPr>
+        <p:txBody>
+          <a:bodyPr wrap="square">
+            <a:spAutoFit/>
+          </a:bodyPr>
+          <a:lstStyle/>
+          <a:p>
+            <a:r>
+              <a:rPr lang="ru-RU" dirty="0" smtClean="0"/>
+              <a:t>Когда </a:t>
+            </a:r>
+            <a:r>
+              <a:rPr lang="ru-RU" dirty="0" err="1" smtClean="0"/>
+              <a:t>репозиторий</a:t>
+            </a:r>
+            <a:r>
+              <a:rPr lang="ru-RU" dirty="0" smtClean="0"/>
+              <a:t> загрузился, переходим в папку с появившейся директорией с помощью команды </a:t>
+            </a:r>
+            <a:r>
+              <a:rPr lang="en-US" dirty="0" smtClean="0"/>
+              <a:t>cd </a:t>
+            </a:r>
+            <a:r>
+              <a:rPr lang="ru-RU" dirty="0" err="1" smtClean="0"/>
+              <a:t>название_репозитория</a:t>
+            </a:r>
+            <a:endParaRPr lang="ru-RU" dirty="0"/>
+          </a:p>
+        </p:txBody>
+      </p:sp>
+      <p:sp>
+        <p:nvSpPr>
+          <p:cNvPr id="8" name="Прямоугольник 7"/>
+          <p:cNvSpPr/>
+          <p:nvPr/>
+        </p:nvSpPr>
+        <p:spPr>
+          <a:xfrm>
+            <a:off x="10191751" y="3209965"/>
+            <a:ext cx="2000250" cy="2308324"/>
+          </a:xfrm>
+          <a:prstGeom prst="rect">
+            <a:avLst/>
+          </a:prstGeom>
+        </p:spPr>
+        <p:txBody>
+          <a:bodyPr wrap="square">
+            <a:spAutoFit/>
+          </a:bodyPr>
+          <a:lstStyle/>
+          <a:p>
+            <a:r>
+              <a:rPr lang="ru-RU" dirty="0" smtClean="0"/>
+              <a:t>Команда </a:t>
+            </a:r>
+            <a:r>
+              <a:rPr lang="en-US" dirty="0" err="1" smtClean="0"/>
+              <a:t>git</a:t>
+            </a:r>
+            <a:r>
+              <a:rPr lang="en-US" dirty="0" smtClean="0"/>
+              <a:t> status </a:t>
+            </a:r>
+            <a:r>
+              <a:rPr lang="ru-RU" dirty="0" smtClean="0"/>
+              <a:t>ваш самый верный друг, который будет вам отображать состояние изменений: есть они или нет</a:t>
+            </a:r>
+            <a:endParaRPr lang="ru-RU" dirty="0"/>
+          </a:p>
+        </p:txBody>
+      </p:sp>
+      <p:sp>
+        <p:nvSpPr>
+          <p:cNvPr id="9" name="Прямоугольник 8"/>
+          <p:cNvSpPr/>
+          <p:nvPr/>
+        </p:nvSpPr>
+        <p:spPr>
+          <a:xfrm>
+            <a:off x="6238430" y="5632615"/>
+            <a:ext cx="5320080" cy="1200329"/>
+          </a:xfrm>
+          <a:prstGeom prst="rect">
+            <a:avLst/>
+          </a:prstGeom>
+        </p:spPr>
+        <p:txBody>
+          <a:bodyPr wrap="square">
+            <a:spAutoFit/>
+          </a:bodyPr>
+          <a:lstStyle/>
+          <a:p>
+            <a:r>
+              <a:rPr lang="ru-RU" dirty="0" smtClean="0"/>
+              <a:t>После проделанной работы в папке с директорией проекта должна появиться папка </a:t>
+            </a:r>
+            <a:r>
+              <a:rPr lang="en-US" dirty="0" smtClean="0"/>
+              <a:t>.</a:t>
+            </a:r>
+            <a:r>
+              <a:rPr lang="en-US" dirty="0" err="1" smtClean="0"/>
+              <a:t>git</a:t>
+            </a:r>
+            <a:r>
+              <a:rPr lang="en-US" dirty="0" smtClean="0"/>
+              <a:t> </a:t>
+            </a:r>
+            <a:r>
+              <a:rPr lang="ru-RU" dirty="0" smtClean="0"/>
+              <a:t>с необходимыми файлами для обеспечения гит-среды, а также файл </a:t>
+            </a:r>
+            <a:r>
+              <a:rPr lang="en-US" dirty="0" smtClean="0"/>
+              <a:t>README, </a:t>
+            </a:r>
+            <a:r>
+              <a:rPr lang="ru-RU" dirty="0" smtClean="0"/>
+              <a:t>если вы его добавили</a:t>
+            </a:r>
+            <a:endParaRPr lang="ru-RU" dirty="0"/>
+          </a:p>
+        </p:txBody>
+      </p:sp>
+      <p:sp>
+        <p:nvSpPr>
+          <p:cNvPr id="10" name="Прямоугольник 9"/>
+          <p:cNvSpPr/>
+          <p:nvPr/>
+        </p:nvSpPr>
+        <p:spPr>
+          <a:xfrm>
+            <a:off x="6362544" y="4297641"/>
+            <a:ext cx="3681780" cy="1200329"/>
+          </a:xfrm>
+          <a:prstGeom prst="rect">
+            <a:avLst/>
+          </a:prstGeom>
+        </p:spPr>
+        <p:txBody>
+          <a:bodyPr wrap="square">
+            <a:spAutoFit/>
+          </a:bodyPr>
+          <a:lstStyle/>
+          <a:p>
+            <a:r>
+              <a:rPr lang="ru-RU" dirty="0" smtClean="0"/>
+              <a:t>Если все выполнено верно, то справа от пути к папке должно отобразиться название основной локальной ветки </a:t>
+            </a:r>
+            <a:r>
+              <a:rPr lang="en-US" dirty="0" smtClean="0">
+                <a:solidFill>
+                  <a:srgbClr val="33CCFF"/>
+                </a:solidFill>
+              </a:rPr>
+              <a:t>main</a:t>
+            </a:r>
+            <a:endParaRPr lang="ru-RU" dirty="0">
+              <a:solidFill>
+                <a:srgbClr val="33CCFF"/>
+              </a:solidFill>
+            </a:endParaRPr>
+          </a:p>
+        </p:txBody>
+      </p:sp>
+    </p:spTree>
+    <p:extLst>
+      <p:ext uri="{BB962C8B-B14F-4D97-AF65-F5344CB8AC3E}">
+        <p14:creationId xmlns:p14="http://schemas.microsoft.com/office/powerpoint/2010/main" val="3090811676"/>
+      </p:ext>
+    </p:extLst>
+  </p:cSld>
+  <p:clrMapOvr>
+    <a:masterClrMapping/>
+  </p:clrMapOvr>
+</p:sld>
+</file>
+
+<file path=ppt/slides/slide18.xml><?xml version="1.0" encoding="utf-8"?>
+<p:sld xmlns:a="http://schemas.openxmlformats.org/drawingml/2006/main" xmlns:r="http://schemas.openxmlformats.org/officeDocument/2006/relationships" xmlns:p="http://schemas.openxmlformats.org/presentationml/2006/main">
+  <p:cSld>
+    <p:spTree>
+      <p:nvGrpSpPr>
+        <p:cNvPr id="1" name=""/>
+        <p:cNvGrpSpPr/>
+        <p:nvPr/>
+      </p:nvGrpSpPr>
+      <p:grpSpPr>
+        <a:xfrm>
+          <a:off x="0" y="0"/>
+          <a:ext cx="0" cy="0"/>
+          <a:chOff x="0" y="0"/>
+          <a:chExt cx="0" cy="0"/>
+        </a:xfrm>
+      </p:grpSpPr>
+      <p:pic>
+        <p:nvPicPr>
+          <p:cNvPr id="2" name="Рисунок 1"/>
+          <p:cNvPicPr>
+            <a:picLocks noChangeAspect="1"/>
+          </p:cNvPicPr>
+          <p:nvPr/>
+        </p:nvPicPr>
+        <p:blipFill>
+          <a:blip r:embed="rId3"/>
+          <a:stretch>
+            <a:fillRect/>
+          </a:stretch>
+        </p:blipFill>
+        <p:spPr>
+          <a:xfrm>
+            <a:off x="279172" y="772959"/>
+            <a:ext cx="11633655" cy="5827865"/>
+          </a:xfrm>
+          <a:prstGeom prst="rect">
+            <a:avLst/>
+          </a:prstGeom>
+        </p:spPr>
+      </p:pic>
+      <p:sp>
+        <p:nvSpPr>
+          <p:cNvPr id="5" name="Прямоугольник 4"/>
+          <p:cNvSpPr/>
+          <p:nvPr/>
+        </p:nvSpPr>
+        <p:spPr>
+          <a:xfrm>
+            <a:off x="6096000" y="674555"/>
+            <a:ext cx="5925825" cy="1743075"/>
+          </a:xfrm>
+          <a:prstGeom prst="rect">
+            <a:avLst/>
+          </a:prstGeom>
+          <a:solidFill>
+            <a:schemeClr val="bg1"/>
+          </a:solidFill>
+          <a:ln>
+            <a:noFill/>
+          </a:ln>
+        </p:spPr>
+        <p:style>
+          <a:lnRef idx="2">
+            <a:schemeClr val="accent1">
+              <a:shade val="50000"/>
+            </a:schemeClr>
+          </a:lnRef>
+          <a:fillRef idx="1">
+            <a:schemeClr val="accent1"/>
+          </a:fillRef>
+          <a:effectRef idx="0">
+            <a:schemeClr val="accent1"/>
+          </a:effectRef>
+          <a:fontRef idx="minor">
+            <a:schemeClr val="lt1"/>
+          </a:fontRef>
+        </p:style>
+        <p:txBody>
+          <a:bodyPr rtlCol="0" anchor="ctr"/>
+          <a:lstStyle/>
+          <a:p>
+            <a:pPr algn="ctr"/>
+            <a:endParaRPr lang="ru-RU"/>
+          </a:p>
+        </p:txBody>
+      </p:sp>
+      <p:sp>
+        <p:nvSpPr>
+          <p:cNvPr id="3" name="Прямоугольник 2"/>
+          <p:cNvSpPr/>
+          <p:nvPr/>
+        </p:nvSpPr>
+        <p:spPr>
+          <a:xfrm>
+            <a:off x="6398872" y="163688"/>
+            <a:ext cx="5320080" cy="923330"/>
+          </a:xfrm>
+          <a:prstGeom prst="rect">
+            <a:avLst/>
+          </a:prstGeom>
+        </p:spPr>
+        <p:txBody>
+          <a:bodyPr wrap="square">
+            <a:spAutoFit/>
+          </a:bodyPr>
+          <a:lstStyle/>
+          <a:p>
+            <a:r>
+              <a:rPr lang="ru-RU" dirty="0" smtClean="0"/>
+              <a:t>Теперь давайте создадим ветку и добавим в нее какие-нибудь файлы или папку. В моем случае – презентации для занятий</a:t>
+            </a:r>
+            <a:endParaRPr lang="ru-RU" dirty="0"/>
+          </a:p>
+        </p:txBody>
+      </p:sp>
+      <p:sp>
+        <p:nvSpPr>
+          <p:cNvPr id="6" name="Прямоугольник 5"/>
+          <p:cNvSpPr/>
+          <p:nvPr/>
+        </p:nvSpPr>
+        <p:spPr>
+          <a:xfrm>
+            <a:off x="6398872" y="1084427"/>
+            <a:ext cx="5320080" cy="1200329"/>
+          </a:xfrm>
+          <a:prstGeom prst="rect">
+            <a:avLst/>
+          </a:prstGeom>
+        </p:spPr>
+        <p:txBody>
+          <a:bodyPr wrap="square">
+            <a:spAutoFit/>
+          </a:bodyPr>
+          <a:lstStyle/>
+          <a:p>
+            <a:r>
+              <a:rPr lang="ru-RU" dirty="0" smtClean="0"/>
+              <a:t>Для создания воспользуемся командой </a:t>
+            </a:r>
+            <a:r>
+              <a:rPr lang="en-US" dirty="0" err="1" smtClean="0"/>
+              <a:t>git</a:t>
+            </a:r>
+            <a:r>
+              <a:rPr lang="en-US" dirty="0" smtClean="0"/>
+              <a:t> branch </a:t>
+            </a:r>
+            <a:r>
+              <a:rPr lang="ru-RU" dirty="0" err="1" smtClean="0"/>
+              <a:t>название_ветки</a:t>
+            </a:r>
+            <a:endParaRPr lang="ru-RU" dirty="0" smtClean="0"/>
+          </a:p>
+          <a:p>
+            <a:r>
+              <a:rPr lang="ru-RU" dirty="0" smtClean="0"/>
+              <a:t>Для перехода по веткам </a:t>
+            </a:r>
+            <a:r>
+              <a:rPr lang="ru-RU" dirty="0" err="1" smtClean="0"/>
+              <a:t>репозитория</a:t>
+            </a:r>
+            <a:r>
+              <a:rPr lang="ru-RU" dirty="0" smtClean="0"/>
+              <a:t> используйте команду </a:t>
+            </a:r>
+            <a:r>
+              <a:rPr lang="en-US" dirty="0" err="1" smtClean="0"/>
+              <a:t>git</a:t>
+            </a:r>
+            <a:r>
+              <a:rPr lang="en-US" dirty="0" smtClean="0"/>
+              <a:t> checkout </a:t>
+            </a:r>
+            <a:r>
+              <a:rPr lang="ru-RU" dirty="0" err="1" smtClean="0"/>
+              <a:t>название_ветки</a:t>
+            </a:r>
+            <a:endParaRPr lang="ru-RU" dirty="0"/>
+          </a:p>
+        </p:txBody>
+      </p:sp>
+      <p:sp>
+        <p:nvSpPr>
+          <p:cNvPr id="7" name="Прямоугольник 6"/>
+          <p:cNvSpPr/>
+          <p:nvPr/>
+        </p:nvSpPr>
+        <p:spPr>
+          <a:xfrm>
+            <a:off x="0" y="3762375"/>
+            <a:ext cx="6398872" cy="3095626"/>
+          </a:xfrm>
+          <a:prstGeom prst="rect">
+            <a:avLst/>
+          </a:prstGeom>
+          <a:solidFill>
+            <a:schemeClr val="bg1"/>
+          </a:solidFill>
+          <a:ln>
+            <a:noFill/>
+          </a:ln>
+        </p:spPr>
+        <p:style>
+          <a:lnRef idx="2">
+            <a:schemeClr val="accent1">
+              <a:shade val="50000"/>
+            </a:schemeClr>
+          </a:lnRef>
+          <a:fillRef idx="1">
+            <a:schemeClr val="accent1"/>
+          </a:fillRef>
+          <a:effectRef idx="0">
+            <a:schemeClr val="accent1"/>
+          </a:effectRef>
+          <a:fontRef idx="minor">
+            <a:schemeClr val="lt1"/>
+          </a:fontRef>
+        </p:style>
+        <p:txBody>
+          <a:bodyPr rtlCol="0" anchor="ctr"/>
+          <a:lstStyle/>
+          <a:p>
+            <a:pPr algn="ctr"/>
+            <a:endParaRPr lang="ru-RU"/>
+          </a:p>
+        </p:txBody>
+      </p:sp>
+      <p:sp>
+        <p:nvSpPr>
+          <p:cNvPr id="8" name="Прямоугольник 7"/>
+          <p:cNvSpPr/>
+          <p:nvPr/>
+        </p:nvSpPr>
+        <p:spPr>
+          <a:xfrm>
+            <a:off x="279172" y="3960680"/>
+            <a:ext cx="5320080" cy="2308324"/>
+          </a:xfrm>
+          <a:prstGeom prst="rect">
+            <a:avLst/>
+          </a:prstGeom>
+        </p:spPr>
+        <p:txBody>
+          <a:bodyPr wrap="square">
+            <a:spAutoFit/>
+          </a:bodyPr>
+          <a:lstStyle/>
+          <a:p>
+            <a:r>
+              <a:rPr lang="ru-RU" dirty="0" smtClean="0"/>
+              <a:t>Теперь в вашей папке с </a:t>
+            </a:r>
+            <a:r>
+              <a:rPr lang="ru-RU" dirty="0" err="1" smtClean="0"/>
+              <a:t>репозиторием</a:t>
+            </a:r>
+            <a:r>
+              <a:rPr lang="ru-RU" dirty="0" smtClean="0"/>
+              <a:t> открыта </a:t>
+            </a:r>
+            <a:r>
+              <a:rPr lang="ru-RU" dirty="0" err="1" smtClean="0"/>
+              <a:t>дериктория</a:t>
+            </a:r>
+            <a:r>
+              <a:rPr lang="ru-RU" dirty="0" smtClean="0"/>
+              <a:t> созданной ветки, в которую вы зашли</a:t>
+            </a:r>
+          </a:p>
+          <a:p>
+            <a:endParaRPr lang="ru-RU" dirty="0"/>
+          </a:p>
+          <a:p>
+            <a:r>
+              <a:rPr lang="ru-RU" dirty="0" smtClean="0"/>
+              <a:t>Добавим в нее файлы и пропишем в </a:t>
+            </a:r>
+            <a:r>
+              <a:rPr lang="ru-RU" dirty="0" err="1" smtClean="0"/>
+              <a:t>консольке</a:t>
+            </a:r>
+            <a:r>
+              <a:rPr lang="ru-RU" dirty="0" smtClean="0"/>
+              <a:t> </a:t>
+            </a:r>
+            <a:r>
+              <a:rPr lang="en-US" dirty="0" err="1" smtClean="0"/>
+              <a:t>git</a:t>
+            </a:r>
+            <a:r>
+              <a:rPr lang="en-US" dirty="0" smtClean="0"/>
+              <a:t> status. </a:t>
+            </a:r>
+            <a:r>
+              <a:rPr lang="ru-RU" dirty="0" smtClean="0"/>
+              <a:t>Вы должны увидеть красные строчки с названиями добавленных или измененных файлов. Красных строк столько, сколько файлов в ветке было изменено и/или добавлено</a:t>
+            </a:r>
+            <a:endParaRPr lang="ru-RU" dirty="0"/>
+          </a:p>
+        </p:txBody>
+      </p:sp>
     </p:spTree>
     <p:extLst>
       <p:ext uri="{BB962C8B-B14F-4D97-AF65-F5344CB8AC3E}">
@@ -8292,7 +9154,7 @@
 </p:sld>
 </file>
 
-<file path=ppt/slides/slide18.xml><?xml version="1.0" encoding="utf-8"?>
+<file path=ppt/slides/slide19.xml><?xml version="1.0" encoding="utf-8"?>
 <p:sld xmlns:a="http://schemas.openxmlformats.org/drawingml/2006/main" xmlns:r="http://schemas.openxmlformats.org/officeDocument/2006/relationships" xmlns:p="http://schemas.openxmlformats.org/presentationml/2006/main">
   <p:cSld>
     <p:spTree>
@@ -8333,119 +9195,300 @@
           </a:prstGeom>
         </p:spPr>
       </p:pic>
-      <p:pic>
-        <p:nvPicPr>
-          <p:cNvPr id="3" name="Рисунок 2"/>
-          <p:cNvPicPr>
-            <a:picLocks noChangeAspect="1"/>
-          </p:cNvPicPr>
+      <p:sp>
+        <p:nvSpPr>
+          <p:cNvPr id="5" name="Прямоугольник 4"/>
+          <p:cNvSpPr/>
           <p:nvPr/>
-        </p:nvPicPr>
-        <p:blipFill>
-          <a:blip r:embed="rId4"/>
-          <a:stretch>
-            <a:fillRect/>
-          </a:stretch>
-        </p:blipFill>
+        </p:nvSpPr>
         <p:spPr>
           <a:xfrm>
-            <a:off x="5641928" y="236537"/>
-            <a:ext cx="6423501" cy="3248408"/>
+            <a:off x="7461022" y="236537"/>
+            <a:ext cx="3235553" cy="461665"/>
           </a:xfrm>
           <a:prstGeom prst="rect">
             <a:avLst/>
           </a:prstGeom>
         </p:spPr>
-      </p:pic>
-      <p:pic>
-        <p:nvPicPr>
-          <p:cNvPr id="4" name="Рисунок 3"/>
-          <p:cNvPicPr>
-            <a:picLocks noChangeAspect="1"/>
-          </p:cNvPicPr>
+        <p:txBody>
+          <a:bodyPr wrap="square">
+            <a:spAutoFit/>
+          </a:bodyPr>
+          <a:lstStyle/>
+          <a:p>
+            <a:r>
+              <a:rPr lang="ru-RU" sz="2400" b="1" dirty="0" smtClean="0"/>
+              <a:t>Теперь внимательно!!</a:t>
+            </a:r>
+            <a:endParaRPr lang="ru-RU" sz="2400" b="1" dirty="0"/>
+          </a:p>
+        </p:txBody>
+      </p:sp>
+      <p:sp>
+        <p:nvSpPr>
+          <p:cNvPr id="6" name="Прямоугольник 5"/>
+          <p:cNvSpPr/>
           <p:nvPr/>
-        </p:nvPicPr>
-        <p:blipFill>
-          <a:blip r:embed="rId5"/>
-          <a:stretch>
-            <a:fillRect/>
-          </a:stretch>
-        </p:blipFill>
+        </p:nvSpPr>
         <p:spPr>
           <a:xfrm>
-            <a:off x="6096000" y="3397043"/>
-            <a:ext cx="5563366" cy="3385347"/>
+            <a:off x="6095999" y="855530"/>
+            <a:ext cx="5857876" cy="1200329"/>
           </a:xfrm>
           <a:prstGeom prst="rect">
             <a:avLst/>
           </a:prstGeom>
         </p:spPr>
-      </p:pic>
-    </p:spTree>
-    <p:extLst>
-      <p:ext uri="{BB962C8B-B14F-4D97-AF65-F5344CB8AC3E}">
-        <p14:creationId xmlns:p14="http://schemas.microsoft.com/office/powerpoint/2010/main" val="3129778853"/>
-      </p:ext>
-    </p:extLst>
-  </p:cSld>
-  <p:clrMapOvr>
-    <a:masterClrMapping/>
-  </p:clrMapOvr>
-  <p:timing>
-    <p:tnLst>
-      <p:par>
-        <p:cTn id="1" dur="indefinite" restart="never" nodeType="tmRoot"/>
-      </p:par>
-    </p:tnLst>
-  </p:timing>
-</p:sld>
-</file>
-
-<file path=ppt/slides/slide19.xml><?xml version="1.0" encoding="utf-8"?>
-<p:sld xmlns:a="http://schemas.openxmlformats.org/drawingml/2006/main" xmlns:r="http://schemas.openxmlformats.org/officeDocument/2006/relationships" xmlns:p="http://schemas.openxmlformats.org/presentationml/2006/main">
-  <p:cSld>
-    <p:spTree>
-      <p:nvGrpSpPr>
-        <p:cNvPr id="1" name=""/>
-        <p:cNvGrpSpPr/>
-        <p:nvPr/>
-      </p:nvGrpSpPr>
-      <p:grpSpPr>
-        <a:xfrm>
-          <a:off x="0" y="0"/>
-          <a:ext cx="0" cy="0"/>
-          <a:chOff x="0" y="0"/>
-          <a:chExt cx="0" cy="0"/>
-        </a:xfrm>
-      </p:grpSpPr>
-      <p:pic>
-        <p:nvPicPr>
-          <p:cNvPr id="5" name="Рисунок 4"/>
-          <p:cNvPicPr>
-            <a:picLocks noChangeAspect="1"/>
-          </p:cNvPicPr>
+        <p:txBody>
+          <a:bodyPr wrap="square">
+            <a:spAutoFit/>
+          </a:bodyPr>
+          <a:lstStyle/>
+          <a:p>
+            <a:r>
+              <a:rPr lang="ru-RU" dirty="0" smtClean="0"/>
+              <a:t>Чтобы добавить изменение 1го файла в гит, пишем команду </a:t>
+            </a:r>
+            <a:r>
+              <a:rPr lang="en-US" dirty="0" err="1" smtClean="0"/>
+              <a:t>git</a:t>
+            </a:r>
+            <a:r>
+              <a:rPr lang="en-US" dirty="0" smtClean="0"/>
+              <a:t> add </a:t>
+            </a:r>
+            <a:r>
+              <a:rPr lang="ru-RU" dirty="0" err="1" smtClean="0"/>
+              <a:t>название_файла</a:t>
+            </a:r>
+            <a:r>
+              <a:rPr lang="ru-RU" dirty="0" smtClean="0"/>
+              <a:t/>
+            </a:r>
+            <a:br>
+              <a:rPr lang="ru-RU" dirty="0" smtClean="0"/>
+            </a:br>
+            <a:r>
+              <a:rPr lang="ru-RU" dirty="0" smtClean="0"/>
+              <a:t>Чтобы добавить ВСЕ изменения, пишем команду </a:t>
+            </a:r>
+            <a:r>
+              <a:rPr lang="en-US" dirty="0" err="1" smtClean="0"/>
+              <a:t>git</a:t>
+            </a:r>
+            <a:r>
+              <a:rPr lang="en-US" dirty="0" smtClean="0"/>
+              <a:t> add .</a:t>
+            </a:r>
+          </a:p>
+          <a:p>
+            <a:r>
+              <a:rPr lang="ru-RU" dirty="0" smtClean="0"/>
+              <a:t>Лучше и эффективнее использовать последний вариант</a:t>
+            </a:r>
+            <a:endParaRPr lang="ru-RU" dirty="0"/>
+          </a:p>
+        </p:txBody>
+      </p:sp>
+      <p:sp>
+        <p:nvSpPr>
+          <p:cNvPr id="7" name="Прямоугольник 6"/>
+          <p:cNvSpPr/>
           <p:nvPr/>
-        </p:nvPicPr>
-        <p:blipFill>
-          <a:blip r:embed="rId3"/>
-          <a:stretch>
-            <a:fillRect/>
-          </a:stretch>
-        </p:blipFill>
+        </p:nvSpPr>
         <p:spPr>
           <a:xfrm>
-            <a:off x="1327729" y="1241199"/>
-            <a:ext cx="9924364" cy="4448627"/>
+            <a:off x="6096000" y="3198680"/>
+            <a:ext cx="5857876" cy="2585323"/>
           </a:xfrm>
           <a:prstGeom prst="rect">
             <a:avLst/>
           </a:prstGeom>
         </p:spPr>
-      </p:pic>
+        <p:txBody>
+          <a:bodyPr wrap="square">
+            <a:spAutoFit/>
+          </a:bodyPr>
+          <a:lstStyle/>
+          <a:p>
+            <a:r>
+              <a:rPr lang="ru-RU" dirty="0" smtClean="0"/>
+              <a:t>Изменения добавлены, теперь необходимо поставить «точку сохранения» в самом дереве </a:t>
+            </a:r>
+            <a:r>
+              <a:rPr lang="ru-RU" dirty="0" err="1" smtClean="0"/>
+              <a:t>репозитория</a:t>
+            </a:r>
+            <a:r>
+              <a:rPr lang="ru-RU" dirty="0" smtClean="0"/>
+              <a:t>. Как в </a:t>
+            </a:r>
+            <a:r>
+              <a:rPr lang="ru-RU" dirty="0" err="1" smtClean="0"/>
+              <a:t>майнкрафте</a:t>
+            </a:r>
+            <a:r>
+              <a:rPr lang="ru-RU" dirty="0" smtClean="0"/>
+              <a:t> вы указываете точку </a:t>
+            </a:r>
+            <a:r>
+              <a:rPr lang="ru-RU" dirty="0" err="1" smtClean="0"/>
+              <a:t>сейва</a:t>
+            </a:r>
+            <a:r>
+              <a:rPr lang="ru-RU" dirty="0" smtClean="0"/>
+              <a:t> или спите, прежде чем пойти в опасное место с риском помереть. И в случае гибели, вы </a:t>
+            </a:r>
+            <a:r>
+              <a:rPr lang="ru-RU" dirty="0" err="1" smtClean="0"/>
+              <a:t>возраждаетесь</a:t>
+            </a:r>
+            <a:r>
+              <a:rPr lang="ru-RU" dirty="0" smtClean="0"/>
+              <a:t> именно в последней точке </a:t>
+            </a:r>
+            <a:r>
+              <a:rPr lang="ru-RU" dirty="0" err="1" smtClean="0"/>
+              <a:t>сейва</a:t>
+            </a:r>
+            <a:r>
+              <a:rPr lang="ru-RU" dirty="0" smtClean="0"/>
+              <a:t>. Тут  та же логика. Короче говоря, пишем команду </a:t>
+            </a:r>
+            <a:r>
+              <a:rPr lang="en-US" dirty="0" err="1" smtClean="0"/>
+              <a:t>git</a:t>
+            </a:r>
+            <a:r>
+              <a:rPr lang="en-US" dirty="0" smtClean="0"/>
+              <a:t> commit –m ‘</a:t>
+            </a:r>
+            <a:r>
+              <a:rPr lang="ru-RU" dirty="0" smtClean="0"/>
+              <a:t>комментарий к сохранению</a:t>
+            </a:r>
+            <a:r>
+              <a:rPr lang="en-US" dirty="0" smtClean="0"/>
+              <a:t>’</a:t>
+            </a:r>
+            <a:r>
+              <a:rPr lang="ru-RU" dirty="0" smtClean="0"/>
+              <a:t>.  Комментарии должны быть краткие и </a:t>
+            </a:r>
+            <a:r>
+              <a:rPr lang="ru-RU" dirty="0" err="1" smtClean="0"/>
+              <a:t>локаничные</a:t>
+            </a:r>
+            <a:r>
+              <a:rPr lang="ru-RU" dirty="0"/>
+              <a:t> </a:t>
+            </a:r>
+            <a:r>
+              <a:rPr lang="ru-RU" dirty="0" smtClean="0"/>
+              <a:t>для понимания, что тут произошло </a:t>
+            </a:r>
+            <a:endParaRPr lang="ru-RU" dirty="0"/>
+          </a:p>
+        </p:txBody>
+      </p:sp>
+      <p:sp>
+        <p:nvSpPr>
+          <p:cNvPr id="8" name="Прямоугольник 7"/>
+          <p:cNvSpPr/>
+          <p:nvPr/>
+        </p:nvSpPr>
+        <p:spPr>
+          <a:xfrm>
+            <a:off x="6096000" y="2165604"/>
+            <a:ext cx="5857876" cy="923330"/>
+          </a:xfrm>
+          <a:prstGeom prst="rect">
+            <a:avLst/>
+          </a:prstGeom>
+        </p:spPr>
+        <p:txBody>
+          <a:bodyPr wrap="square">
+            <a:spAutoFit/>
+          </a:bodyPr>
+          <a:lstStyle/>
+          <a:p>
+            <a:r>
+              <a:rPr lang="ru-RU" dirty="0" smtClean="0"/>
+              <a:t>Если после этой команды прописать </a:t>
+            </a:r>
+            <a:r>
+              <a:rPr lang="en-US" dirty="0" err="1" smtClean="0"/>
+              <a:t>git</a:t>
+            </a:r>
+            <a:r>
+              <a:rPr lang="en-US" dirty="0" smtClean="0"/>
+              <a:t> status </a:t>
+            </a:r>
+            <a:r>
+              <a:rPr lang="ru-RU" dirty="0" smtClean="0"/>
+              <a:t>(пропишите сейчас), то вы увидите тот же список измененных файлов, но окрашен он уже будет зеленым цветом</a:t>
+            </a:r>
+            <a:endParaRPr lang="ru-RU" dirty="0"/>
+          </a:p>
+        </p:txBody>
+      </p:sp>
+      <p:sp>
+        <p:nvSpPr>
+          <p:cNvPr id="9" name="Прямоугольник 8"/>
+          <p:cNvSpPr/>
+          <p:nvPr/>
+        </p:nvSpPr>
+        <p:spPr>
+          <a:xfrm>
+            <a:off x="5943599" y="5983810"/>
+            <a:ext cx="6162675" cy="646331"/>
+          </a:xfrm>
+          <a:prstGeom prst="rect">
+            <a:avLst/>
+          </a:prstGeom>
+        </p:spPr>
+        <p:txBody>
+          <a:bodyPr wrap="square">
+            <a:spAutoFit/>
+          </a:bodyPr>
+          <a:lstStyle/>
+          <a:p>
+            <a:r>
+              <a:rPr lang="ru-RU" dirty="0" smtClean="0"/>
+              <a:t>Дело за малым: надо отправить изменения в удаленный </a:t>
+            </a:r>
+            <a:r>
+              <a:rPr lang="ru-RU" dirty="0" err="1" smtClean="0"/>
+              <a:t>репозиторий</a:t>
+            </a:r>
+            <a:r>
+              <a:rPr lang="ru-RU" dirty="0" smtClean="0"/>
+              <a:t> на </a:t>
+            </a:r>
+            <a:r>
+              <a:rPr lang="ru-RU" dirty="0" err="1" smtClean="0"/>
+              <a:t>гитхаб</a:t>
+            </a:r>
+            <a:r>
+              <a:rPr lang="ru-RU" dirty="0" smtClean="0"/>
+              <a:t>. Всего лишь нужно прописать </a:t>
+            </a:r>
+            <a:r>
+              <a:rPr lang="en-US" dirty="0" err="1" smtClean="0"/>
+              <a:t>git</a:t>
+            </a:r>
+            <a:r>
+              <a:rPr lang="en-US" dirty="0" smtClean="0"/>
+              <a:t> push</a:t>
+            </a:r>
+            <a:endParaRPr lang="ru-RU" dirty="0"/>
+          </a:p>
+        </p:txBody>
+      </p:sp>
     </p:spTree>
     <p:extLst>
       <p:ext uri="{BB962C8B-B14F-4D97-AF65-F5344CB8AC3E}">
-        <p14:creationId xmlns:p14="http://schemas.microsoft.com/office/powerpoint/2010/main" val="711417850"/>
+        <p14:creationId xmlns:p14="http://schemas.microsoft.com/office/powerpoint/2010/main" val="3129778853"/>
       </p:ext>
     </p:extLst>
   </p:cSld>
@@ -9467,6 +10510,390 @@
 </file>
 
 <file path=ppt/slides/slide20.xml><?xml version="1.0" encoding="utf-8"?>
+<p:sld xmlns:a="http://schemas.openxmlformats.org/drawingml/2006/main" xmlns:r="http://schemas.openxmlformats.org/officeDocument/2006/relationships" xmlns:p="http://schemas.openxmlformats.org/presentationml/2006/main">
+  <p:cSld>
+    <p:spTree>
+      <p:nvGrpSpPr>
+        <p:cNvPr id="1" name=""/>
+        <p:cNvGrpSpPr/>
+        <p:nvPr/>
+      </p:nvGrpSpPr>
+      <p:grpSpPr>
+        <a:xfrm>
+          <a:off x="0" y="0"/>
+          <a:ext cx="0" cy="0"/>
+          <a:chOff x="0" y="0"/>
+          <a:chExt cx="0" cy="0"/>
+        </a:xfrm>
+      </p:grpSpPr>
+      <p:pic>
+        <p:nvPicPr>
+          <p:cNvPr id="5" name="Рисунок 4"/>
+          <p:cNvPicPr>
+            <a:picLocks noChangeAspect="1"/>
+          </p:cNvPicPr>
+          <p:nvPr/>
+        </p:nvPicPr>
+        <p:blipFill>
+          <a:blip r:embed="rId3"/>
+          <a:stretch>
+            <a:fillRect/>
+          </a:stretch>
+        </p:blipFill>
+        <p:spPr>
+          <a:xfrm>
+            <a:off x="1251529" y="374424"/>
+            <a:ext cx="9924364" cy="4448627"/>
+          </a:xfrm>
+          <a:prstGeom prst="rect">
+            <a:avLst/>
+          </a:prstGeom>
+        </p:spPr>
+      </p:pic>
+      <p:sp>
+        <p:nvSpPr>
+          <p:cNvPr id="3" name="Прямоугольник 2"/>
+          <p:cNvSpPr/>
+          <p:nvPr/>
+        </p:nvSpPr>
+        <p:spPr>
+          <a:xfrm>
+            <a:off x="270454" y="4974160"/>
+            <a:ext cx="6162675" cy="1754326"/>
+          </a:xfrm>
+          <a:prstGeom prst="rect">
+            <a:avLst/>
+          </a:prstGeom>
+        </p:spPr>
+        <p:txBody>
+          <a:bodyPr wrap="square">
+            <a:spAutoFit/>
+          </a:bodyPr>
+          <a:lstStyle/>
+          <a:p>
+            <a:r>
+              <a:rPr lang="ru-RU" dirty="0" smtClean="0"/>
+              <a:t>Почему гит пишет </a:t>
+            </a:r>
+            <a:r>
+              <a:rPr lang="en-US" dirty="0" smtClean="0"/>
+              <a:t>fatal</a:t>
+            </a:r>
+            <a:r>
+              <a:rPr lang="ru-RU" dirty="0" smtClean="0"/>
+              <a:t>? Да потому что этой ветки нет на удаленном </a:t>
+            </a:r>
+            <a:r>
+              <a:rPr lang="ru-RU" dirty="0" err="1" smtClean="0"/>
+              <a:t>репозитории</a:t>
+            </a:r>
+            <a:r>
+              <a:rPr lang="ru-RU" dirty="0" smtClean="0"/>
+              <a:t> и она им не отслеживается. Но гит лоялен и предлагает вам альтернативный вариант команды, которая способствует привязке ветки к удаленному </a:t>
+            </a:r>
+            <a:r>
+              <a:rPr lang="ru-RU" dirty="0" err="1" smtClean="0"/>
+              <a:t>репозиторию</a:t>
+            </a:r>
+            <a:r>
+              <a:rPr lang="ru-RU" dirty="0" smtClean="0"/>
+              <a:t> </a:t>
+            </a:r>
+            <a:r>
+              <a:rPr lang="en-US" dirty="0" smtClean="0"/>
+              <a:t>origin </a:t>
+            </a:r>
+            <a:r>
+              <a:rPr lang="ru-RU" dirty="0" smtClean="0"/>
+              <a:t>и одновременно «пушит» туда все изменения и </a:t>
+            </a:r>
+            <a:r>
+              <a:rPr lang="ru-RU" dirty="0" err="1" smtClean="0"/>
+              <a:t>коммиты</a:t>
+            </a:r>
+            <a:r>
+              <a:rPr lang="ru-RU" dirty="0" smtClean="0"/>
+              <a:t>, которые вы сделали локально</a:t>
+            </a:r>
+            <a:endParaRPr lang="ru-RU" dirty="0"/>
+          </a:p>
+        </p:txBody>
+      </p:sp>
+      <p:sp>
+        <p:nvSpPr>
+          <p:cNvPr id="4" name="Прямоугольник 3"/>
+          <p:cNvSpPr/>
+          <p:nvPr/>
+        </p:nvSpPr>
+        <p:spPr>
+          <a:xfrm>
+            <a:off x="6433129" y="4974160"/>
+            <a:ext cx="5568371" cy="923330"/>
+          </a:xfrm>
+          <a:prstGeom prst="rect">
+            <a:avLst/>
+          </a:prstGeom>
+        </p:spPr>
+        <p:txBody>
+          <a:bodyPr wrap="square">
+            <a:spAutoFit/>
+          </a:bodyPr>
+          <a:lstStyle/>
+          <a:p>
+            <a:r>
+              <a:rPr lang="ru-RU" dirty="0" smtClean="0"/>
+              <a:t>В общем и целом вам нужно скопировать эту команду (помним, что делаем это мышкой, а не клавишами) и вставить ее далее. Все получится, если все правильно</a:t>
+            </a:r>
+            <a:endParaRPr lang="ru-RU" dirty="0"/>
+          </a:p>
+        </p:txBody>
+      </p:sp>
+      <p:sp>
+        <p:nvSpPr>
+          <p:cNvPr id="6" name="Прямоугольник 5"/>
+          <p:cNvSpPr/>
+          <p:nvPr/>
+        </p:nvSpPr>
+        <p:spPr>
+          <a:xfrm>
+            <a:off x="6433129" y="6048599"/>
+            <a:ext cx="5568371" cy="646331"/>
+          </a:xfrm>
+          <a:prstGeom prst="rect">
+            <a:avLst/>
+          </a:prstGeom>
+        </p:spPr>
+        <p:txBody>
+          <a:bodyPr wrap="square">
+            <a:spAutoFit/>
+          </a:bodyPr>
+          <a:lstStyle/>
+          <a:p>
+            <a:r>
+              <a:rPr lang="ru-RU" dirty="0" smtClean="0"/>
+              <a:t>Контрольная проверка </a:t>
+            </a:r>
+            <a:r>
+              <a:rPr lang="en-US" dirty="0" err="1" smtClean="0"/>
+              <a:t>git</a:t>
+            </a:r>
+            <a:r>
+              <a:rPr lang="en-US" dirty="0" smtClean="0"/>
+              <a:t> status </a:t>
+            </a:r>
+            <a:r>
+              <a:rPr lang="ru-RU" dirty="0" smtClean="0"/>
+              <a:t>(все как на картинке)</a:t>
+            </a:r>
+          </a:p>
+          <a:p>
+            <a:r>
+              <a:rPr lang="ru-RU" dirty="0" smtClean="0"/>
+              <a:t>Команда </a:t>
+            </a:r>
+            <a:r>
+              <a:rPr lang="en-US" dirty="0" smtClean="0"/>
+              <a:t>ls </a:t>
+            </a:r>
+            <a:r>
+              <a:rPr lang="ru-RU" dirty="0" smtClean="0"/>
+              <a:t>выведет вам все файлы данной папки</a:t>
+            </a:r>
+            <a:endParaRPr lang="ru-RU" dirty="0"/>
+          </a:p>
+        </p:txBody>
+      </p:sp>
+    </p:spTree>
+    <p:extLst>
+      <p:ext uri="{BB962C8B-B14F-4D97-AF65-F5344CB8AC3E}">
+        <p14:creationId xmlns:p14="http://schemas.microsoft.com/office/powerpoint/2010/main" val="711417850"/>
+      </p:ext>
+    </p:extLst>
+  </p:cSld>
+  <p:clrMapOvr>
+    <a:masterClrMapping/>
+  </p:clrMapOvr>
+  <p:timing>
+    <p:tnLst>
+      <p:par>
+        <p:cTn id="1" dur="indefinite" restart="never" nodeType="tmRoot"/>
+      </p:par>
+    </p:tnLst>
+  </p:timing>
+</p:sld>
+</file>
+
+<file path=ppt/slides/slide21.xml><?xml version="1.0" encoding="utf-8"?>
+<p:sld xmlns:a="http://schemas.openxmlformats.org/drawingml/2006/main" xmlns:r="http://schemas.openxmlformats.org/officeDocument/2006/relationships" xmlns:p="http://schemas.openxmlformats.org/presentationml/2006/main">
+  <p:cSld>
+    <p:spTree>
+      <p:nvGrpSpPr>
+        <p:cNvPr id="1" name=""/>
+        <p:cNvGrpSpPr/>
+        <p:nvPr/>
+      </p:nvGrpSpPr>
+      <p:grpSpPr>
+        <a:xfrm>
+          <a:off x="0" y="0"/>
+          <a:ext cx="0" cy="0"/>
+          <a:chOff x="0" y="0"/>
+          <a:chExt cx="0" cy="0"/>
+        </a:xfrm>
+      </p:grpSpPr>
+      <p:pic>
+        <p:nvPicPr>
+          <p:cNvPr id="2" name="Рисунок 1"/>
+          <p:cNvPicPr>
+            <a:picLocks noChangeAspect="1"/>
+          </p:cNvPicPr>
+          <p:nvPr/>
+        </p:nvPicPr>
+        <p:blipFill>
+          <a:blip r:embed="rId2"/>
+          <a:stretch>
+            <a:fillRect/>
+          </a:stretch>
+        </p:blipFill>
+        <p:spPr>
+          <a:xfrm>
+            <a:off x="6198566" y="3539918"/>
+            <a:ext cx="5563366" cy="3385347"/>
+          </a:xfrm>
+          <a:prstGeom prst="rect">
+            <a:avLst/>
+          </a:prstGeom>
+        </p:spPr>
+      </p:pic>
+      <p:pic>
+        <p:nvPicPr>
+          <p:cNvPr id="3" name="Рисунок 2"/>
+          <p:cNvPicPr>
+            <a:picLocks noChangeAspect="1"/>
+          </p:cNvPicPr>
+          <p:nvPr/>
+        </p:nvPicPr>
+        <p:blipFill>
+          <a:blip r:embed="rId3"/>
+          <a:stretch>
+            <a:fillRect/>
+          </a:stretch>
+        </p:blipFill>
+        <p:spPr>
+          <a:xfrm>
+            <a:off x="5768499" y="0"/>
+            <a:ext cx="6423501" cy="3248408"/>
+          </a:xfrm>
+          <a:prstGeom prst="rect">
+            <a:avLst/>
+          </a:prstGeom>
+        </p:spPr>
+      </p:pic>
+      <p:sp>
+        <p:nvSpPr>
+          <p:cNvPr id="4" name="Прямоугольник 3"/>
+          <p:cNvSpPr/>
+          <p:nvPr/>
+        </p:nvSpPr>
+        <p:spPr>
+          <a:xfrm>
+            <a:off x="95249" y="909306"/>
+            <a:ext cx="5857876" cy="4678204"/>
+          </a:xfrm>
+          <a:prstGeom prst="rect">
+            <a:avLst/>
+          </a:prstGeom>
+        </p:spPr>
+        <p:txBody>
+          <a:bodyPr wrap="square">
+            <a:spAutoFit/>
+          </a:bodyPr>
+          <a:lstStyle/>
+          <a:p>
+            <a:r>
+              <a:rPr lang="ru-RU" dirty="0" smtClean="0"/>
+              <a:t>Пошли проверять результат проделанной работы в </a:t>
+            </a:r>
+            <a:r>
+              <a:rPr lang="en-US" dirty="0" err="1" smtClean="0"/>
+              <a:t>github</a:t>
+            </a:r>
+            <a:endParaRPr lang="en-US" dirty="0"/>
+          </a:p>
+          <a:p>
+            <a:endParaRPr lang="en-US" dirty="0" smtClean="0"/>
+          </a:p>
+          <a:p>
+            <a:r>
+              <a:rPr lang="ru-RU" dirty="0" smtClean="0"/>
+              <a:t>Заходим, слева видим кнопку с меню веток, выбираем нашу созданную ветку в нем и видим список тех файлов, которые были добавлены.</a:t>
+            </a:r>
+          </a:p>
+          <a:p>
+            <a:endParaRPr lang="ru-RU" dirty="0"/>
+          </a:p>
+          <a:p>
+            <a:r>
+              <a:rPr lang="ru-RU" dirty="0" smtClean="0"/>
+              <a:t>Но на самом деле это </a:t>
+            </a:r>
+            <a:r>
+              <a:rPr lang="ru-RU" dirty="0" err="1" smtClean="0"/>
+              <a:t>коммиты</a:t>
+            </a:r>
+            <a:r>
+              <a:rPr lang="ru-RU" dirty="0"/>
+              <a:t> </a:t>
+            </a:r>
+            <a:r>
+              <a:rPr lang="ru-RU" dirty="0" smtClean="0"/>
+              <a:t>(обратите внимание на центральный столбик)</a:t>
+            </a:r>
+          </a:p>
+          <a:p>
+            <a:endParaRPr lang="ru-RU" dirty="0" smtClean="0"/>
+          </a:p>
+          <a:p>
+            <a:endParaRPr lang="ru-RU" dirty="0"/>
+          </a:p>
+          <a:p>
+            <a:endParaRPr lang="ru-RU" dirty="0" smtClean="0"/>
+          </a:p>
+          <a:p>
+            <a:endParaRPr lang="ru-RU" dirty="0"/>
+          </a:p>
+          <a:p>
+            <a:endParaRPr lang="ru-RU" dirty="0" smtClean="0"/>
+          </a:p>
+          <a:p>
+            <a:endParaRPr lang="ru-RU" dirty="0"/>
+          </a:p>
+          <a:p>
+            <a:endParaRPr lang="ru-RU" dirty="0"/>
+          </a:p>
+          <a:p>
+            <a:pPr algn="ctr"/>
+            <a:r>
+              <a:rPr lang="ru-RU" sz="2800" dirty="0" smtClean="0"/>
+              <a:t>Вы просто очень молодец!</a:t>
+            </a:r>
+            <a:endParaRPr lang="ru-RU" sz="2800" dirty="0"/>
+          </a:p>
+        </p:txBody>
+      </p:sp>
+    </p:spTree>
+    <p:extLst>
+      <p:ext uri="{BB962C8B-B14F-4D97-AF65-F5344CB8AC3E}">
+        <p14:creationId xmlns:p14="http://schemas.microsoft.com/office/powerpoint/2010/main" val="2431959458"/>
+      </p:ext>
+    </p:extLst>
+  </p:cSld>
+  <p:clrMapOvr>
+    <a:masterClrMapping/>
+  </p:clrMapOvr>
+</p:sld>
+</file>
+
+<file path=ppt/slides/slide22.xml><?xml version="1.0" encoding="utf-8"?>
 <p:sld xmlns:a="http://schemas.openxmlformats.org/drawingml/2006/main" xmlns:r="http://schemas.openxmlformats.org/officeDocument/2006/relationships" xmlns:p="http://schemas.openxmlformats.org/presentationml/2006/main">
   <p:cSld>
     <p:spTree>
@@ -9515,16 +10942,15 @@
           </p:cNvPicPr>
           <p:nvPr/>
         </p:nvPicPr>
-        <p:blipFill>
+        <p:blipFill rotWithShape="1">
           <a:blip r:embed="rId4"/>
-          <a:stretch>
-            <a:fillRect/>
-          </a:stretch>
+          <a:srcRect t="80232"/>
+          <a:stretch/>
         </p:blipFill>
         <p:spPr>
           <a:xfrm>
-            <a:off x="5143081" y="533400"/>
-            <a:ext cx="6811326" cy="2353003"/>
+            <a:off x="0" y="1760388"/>
+            <a:ext cx="6811326" cy="465138"/>
           </a:xfrm>
           <a:prstGeom prst="rect">
             <a:avLst/>
@@ -9546,14 +10972,154 @@
         </p:blipFill>
         <p:spPr>
           <a:xfrm>
-            <a:off x="5665078" y="2886460"/>
-            <a:ext cx="5767331" cy="3971540"/>
+            <a:off x="255167" y="2714624"/>
+            <a:ext cx="5491253" cy="3781425"/>
+          </a:xfrm>
+          <a:prstGeom prst="rect">
+            <a:avLst/>
+          </a:prstGeom>
+          <a:ln>
+            <a:noFill/>
+          </a:ln>
+          <a:effectLst>
+            <a:outerShdw blurRad="292100" dist="139700" dir="2700000" algn="tl" rotWithShape="0">
+              <a:srgbClr val="333333">
+                <a:alpha val="65000"/>
+              </a:srgbClr>
+            </a:outerShdw>
+          </a:effectLst>
+        </p:spPr>
+      </p:pic>
+      <p:sp>
+        <p:nvSpPr>
+          <p:cNvPr id="5" name="Прямоугольник 4"/>
+          <p:cNvSpPr/>
+          <p:nvPr/>
+        </p:nvSpPr>
+        <p:spPr>
+          <a:xfrm>
+            <a:off x="6423604" y="71735"/>
+            <a:ext cx="5568371" cy="923330"/>
           </a:xfrm>
           <a:prstGeom prst="rect">
             <a:avLst/>
           </a:prstGeom>
         </p:spPr>
-      </p:pic>
+        <p:txBody>
+          <a:bodyPr wrap="square">
+            <a:spAutoFit/>
+          </a:bodyPr>
+          <a:lstStyle/>
+          <a:p>
+            <a:r>
+              <a:rPr lang="ru-RU" dirty="0" smtClean="0"/>
+              <a:t>Как посмотреть на список веток в вашем </a:t>
+            </a:r>
+            <a:r>
+              <a:rPr lang="ru-RU" dirty="0" err="1" smtClean="0"/>
+              <a:t>репозитории</a:t>
+            </a:r>
+            <a:r>
+              <a:rPr lang="ru-RU" dirty="0" smtClean="0"/>
+              <a:t>? Пишите </a:t>
+            </a:r>
+            <a:r>
+              <a:rPr lang="en-US" dirty="0" err="1" smtClean="0"/>
+              <a:t>git</a:t>
+            </a:r>
+            <a:r>
+              <a:rPr lang="en-US" dirty="0" smtClean="0"/>
+              <a:t> branch. </a:t>
+            </a:r>
+            <a:r>
+              <a:rPr lang="ru-RU" dirty="0" smtClean="0"/>
+              <a:t>Звездочкой будет помечена та ветка, на которой вы сейчас находитесь</a:t>
+            </a:r>
+            <a:endParaRPr lang="ru-RU" dirty="0"/>
+          </a:p>
+        </p:txBody>
+      </p:sp>
+      <p:sp>
+        <p:nvSpPr>
+          <p:cNvPr id="6" name="Прямоугольник 5"/>
+          <p:cNvSpPr/>
+          <p:nvPr/>
+        </p:nvSpPr>
+        <p:spPr>
+          <a:xfrm>
+            <a:off x="6423604" y="3312674"/>
+            <a:ext cx="5568371" cy="2585323"/>
+          </a:xfrm>
+          <a:prstGeom prst="rect">
+            <a:avLst/>
+          </a:prstGeom>
+        </p:spPr>
+        <p:txBody>
+          <a:bodyPr wrap="square">
+            <a:spAutoFit/>
+          </a:bodyPr>
+          <a:lstStyle/>
+          <a:p>
+            <a:r>
+              <a:rPr lang="ru-RU" dirty="0" smtClean="0"/>
+              <a:t>А хотите посмотреть на свое деревце? Напишите команду </a:t>
+            </a:r>
+            <a:r>
+              <a:rPr lang="en-US" dirty="0" err="1" smtClean="0"/>
+              <a:t>gitk</a:t>
+            </a:r>
+            <a:r>
+              <a:rPr lang="ru-RU" dirty="0" smtClean="0"/>
+              <a:t>, погодите, пока загрузится.</a:t>
+            </a:r>
+            <a:br>
+              <a:rPr lang="ru-RU" dirty="0" smtClean="0"/>
+            </a:br>
+            <a:r>
+              <a:rPr lang="ru-RU" dirty="0" smtClean="0"/>
+              <a:t/>
+            </a:r>
+            <a:br>
+              <a:rPr lang="ru-RU" dirty="0" smtClean="0"/>
+            </a:br>
+            <a:r>
+              <a:rPr lang="ru-RU" dirty="0" smtClean="0"/>
+              <a:t>Вылезет вот такое окошечко. А вот и ваш прорастающий росточек. Снизу отображены </a:t>
+            </a:r>
+            <a:r>
+              <a:rPr lang="ru-RU" dirty="0" err="1" smtClean="0"/>
+              <a:t>коммиты</a:t>
+            </a:r>
+            <a:r>
+              <a:rPr lang="ru-RU" dirty="0" smtClean="0"/>
+              <a:t>, слева для выбранного </a:t>
+            </a:r>
+            <a:r>
+              <a:rPr lang="ru-RU" dirty="0" err="1" smtClean="0"/>
+              <a:t>коммита</a:t>
+            </a:r>
+            <a:r>
+              <a:rPr lang="ru-RU" dirty="0" smtClean="0"/>
+              <a:t> показывается список файлов на данной точке. </a:t>
+            </a:r>
+            <a:br>
+              <a:rPr lang="ru-RU" dirty="0" smtClean="0"/>
+            </a:br>
+            <a:r>
+              <a:rPr lang="ru-RU" dirty="0" smtClean="0"/>
+              <a:t/>
+            </a:r>
+            <a:br>
+              <a:rPr lang="ru-RU" dirty="0" smtClean="0"/>
+            </a:br>
+            <a:r>
+              <a:rPr lang="ru-RU" dirty="0" smtClean="0"/>
+              <a:t>Красота!</a:t>
+            </a:r>
+            <a:endParaRPr lang="ru-RU" dirty="0"/>
+          </a:p>
+        </p:txBody>
+      </p:sp>
     </p:spTree>
     <p:extLst>
       <p:ext uri="{BB962C8B-B14F-4D97-AF65-F5344CB8AC3E}">
@@ -9574,7 +11140,7 @@
 </p:sld>
 </file>
 
-<file path=ppt/slides/slide21.xml><?xml version="1.0" encoding="utf-8"?>
+<file path=ppt/slides/slide23.xml><?xml version="1.0" encoding="utf-8"?>
 <p:sld xmlns:a="http://schemas.openxmlformats.org/drawingml/2006/main" xmlns:r="http://schemas.openxmlformats.org/officeDocument/2006/relationships" xmlns:p="http://schemas.openxmlformats.org/presentationml/2006/main">
   <p:cSld>
     <p:spTree>
@@ -9607,7 +11173,7 @@
         </p:blipFill>
         <p:spPr>
           <a:xfrm>
-            <a:off x="3325122" y="252639"/>
+            <a:off x="448572" y="252639"/>
             <a:ext cx="5275953" cy="6425747"/>
           </a:xfrm>
           <a:prstGeom prst="rect">
@@ -9615,6 +11181,63 @@
           </a:prstGeom>
         </p:spPr>
       </p:pic>
+      <p:sp>
+        <p:nvSpPr>
+          <p:cNvPr id="4" name="Прямоугольник 3"/>
+          <p:cNvSpPr/>
+          <p:nvPr/>
+        </p:nvSpPr>
+        <p:spPr>
+          <a:xfrm>
+            <a:off x="6309304" y="2091035"/>
+            <a:ext cx="5568371" cy="1200329"/>
+          </a:xfrm>
+          <a:prstGeom prst="rect">
+            <a:avLst/>
+          </a:prstGeom>
+        </p:spPr>
+        <p:txBody>
+          <a:bodyPr wrap="square">
+            <a:spAutoFit/>
+          </a:bodyPr>
+          <a:lstStyle/>
+          <a:p>
+            <a:r>
+              <a:rPr lang="ru-RU" dirty="0" smtClean="0"/>
+              <a:t>Забыли команду? Гит поможет</a:t>
+            </a:r>
+            <a:br>
+              <a:rPr lang="ru-RU" dirty="0" smtClean="0"/>
+            </a:br>
+            <a:r>
+              <a:rPr lang="en-US" dirty="0" err="1" smtClean="0"/>
+              <a:t>git</a:t>
+            </a:r>
+            <a:r>
+              <a:rPr lang="en-US" dirty="0" smtClean="0"/>
+              <a:t> help </a:t>
+            </a:r>
+            <a:r>
+              <a:rPr lang="ru-RU" dirty="0" smtClean="0"/>
+              <a:t>выведет вам список основных команд с пояснениями, правда они на английском….</a:t>
+            </a:r>
+            <a:br>
+              <a:rPr lang="ru-RU" dirty="0" smtClean="0"/>
+            </a:br>
+            <a:r>
+              <a:rPr lang="ru-RU" dirty="0" smtClean="0"/>
+              <a:t>Ну, если что, переводчик в помощь </a:t>
+            </a:r>
+            <a:r>
+              <a:rPr lang="ru-RU" dirty="0" smtClean="0">
+                <a:sym typeface="Wingdings" panose="05000000000000000000" pitchFamily="2" charset="2"/>
+              </a:rPr>
+              <a:t></a:t>
+            </a:r>
+            <a:endParaRPr lang="ru-RU" dirty="0"/>
+          </a:p>
+        </p:txBody>
+      </p:sp>
     </p:spTree>
     <p:extLst>
       <p:ext uri="{BB962C8B-B14F-4D97-AF65-F5344CB8AC3E}">
@@ -9635,7 +11258,7 @@
 </p:sld>
 </file>
 
-<file path=ppt/slides/slide22.xml><?xml version="1.0" encoding="utf-8"?>
+<file path=ppt/slides/slide24.xml><?xml version="1.0" encoding="utf-8"?>
 <p:sld xmlns:a="http://schemas.openxmlformats.org/drawingml/2006/main" xmlns:r="http://schemas.openxmlformats.org/officeDocument/2006/relationships" xmlns:p="http://schemas.openxmlformats.org/presentationml/2006/main">
   <p:cSld>
     <p:spTree>
@@ -9668,7 +11291,7 @@
         </p:blipFill>
         <p:spPr>
           <a:xfrm>
-            <a:off x="2902176" y="464325"/>
+            <a:off x="120876" y="473850"/>
             <a:ext cx="6649378" cy="5715798"/>
           </a:xfrm>
           <a:prstGeom prst="rect">
@@ -9676,6 +11299,90 @@
           </a:prstGeom>
         </p:spPr>
       </p:pic>
+      <p:sp>
+        <p:nvSpPr>
+          <p:cNvPr id="2" name="Прямоугольник 1"/>
+          <p:cNvSpPr/>
+          <p:nvPr/>
+        </p:nvSpPr>
+        <p:spPr>
+          <a:xfrm>
+            <a:off x="6915150" y="2131420"/>
+            <a:ext cx="5133975" cy="2862322"/>
+          </a:xfrm>
+          <a:prstGeom prst="rect">
+            <a:avLst/>
+          </a:prstGeom>
+        </p:spPr>
+        <p:txBody>
+          <a:bodyPr wrap="square">
+            <a:spAutoFit/>
+          </a:bodyPr>
+          <a:lstStyle/>
+          <a:p>
+            <a:r>
+              <a:rPr lang="ru-RU" dirty="0" smtClean="0"/>
+              <a:t>Когда вы что-то изменяете, перед измененным файлом появится слово </a:t>
+            </a:r>
+            <a:r>
+              <a:rPr lang="en-US" dirty="0" smtClean="0"/>
+              <a:t>modified</a:t>
+            </a:r>
+            <a:r>
+              <a:rPr lang="ru-RU" dirty="0" smtClean="0"/>
+              <a:t/>
+            </a:r>
+            <a:br>
+              <a:rPr lang="ru-RU" dirty="0" smtClean="0"/>
+            </a:br>
+            <a:r>
+              <a:rPr lang="ru-RU" dirty="0" smtClean="0"/>
+              <a:t>Это логично</a:t>
+            </a:r>
+          </a:p>
+          <a:p>
+            <a:endParaRPr lang="ru-RU" dirty="0"/>
+          </a:p>
+          <a:p>
+            <a:r>
+              <a:rPr lang="ru-RU" dirty="0" smtClean="0"/>
+              <a:t>Воспроизводим все те же самые действия</a:t>
+            </a:r>
+          </a:p>
+          <a:p>
+            <a:endParaRPr lang="ru-RU" dirty="0"/>
+          </a:p>
+          <a:p>
+            <a:r>
+              <a:rPr lang="ru-RU" dirty="0" smtClean="0"/>
+              <a:t>Чем чаще </a:t>
+            </a:r>
+            <a:r>
+              <a:rPr lang="ru-RU" dirty="0" err="1" smtClean="0"/>
+              <a:t>коммиты</a:t>
+            </a:r>
+            <a:r>
+              <a:rPr lang="ru-RU" dirty="0" smtClean="0"/>
+              <a:t> – тем лучше</a:t>
+            </a:r>
+          </a:p>
+          <a:p>
+            <a:r>
+              <a:rPr lang="ru-RU" dirty="0" smtClean="0"/>
+              <a:t>Если вам надо будет «откатиться» назад из-за ошибок, то вам меньше </a:t>
+            </a:r>
+            <a:r>
+              <a:rPr lang="ru-RU" dirty="0"/>
+              <a:t>придется </a:t>
+            </a:r>
+            <a:r>
+              <a:rPr lang="ru-RU" dirty="0" smtClean="0"/>
+              <a:t>восстанавливать все то, что вы все это время создавали.</a:t>
+            </a:r>
+            <a:endParaRPr lang="ru-RU" dirty="0"/>
+          </a:p>
+        </p:txBody>
+      </p:sp>
     </p:spTree>
     <p:extLst>
       <p:ext uri="{BB962C8B-B14F-4D97-AF65-F5344CB8AC3E}">
@@ -9696,7 +11403,7 @@
 </p:sld>
 </file>
 
-<file path=ppt/slides/slide23.xml><?xml version="1.0" encoding="utf-8"?>
+<file path=ppt/slides/slide25.xml><?xml version="1.0" encoding="utf-8"?>
 <p:sld xmlns:a="http://schemas.openxmlformats.org/drawingml/2006/main" xmlns:r="http://schemas.openxmlformats.org/officeDocument/2006/relationships" xmlns:p="http://schemas.openxmlformats.org/presentationml/2006/main">
   <p:cSld>
     <p:spTree>
@@ -9753,14 +11460,63 @@
         </p:blipFill>
         <p:spPr>
           <a:xfrm>
-            <a:off x="884999" y="1974866"/>
-            <a:ext cx="10422002" cy="3911583"/>
+            <a:off x="1551749" y="1370771"/>
+            <a:ext cx="8899303" cy="3340084"/>
           </a:xfrm>
           <a:prstGeom prst="rect">
             <a:avLst/>
           </a:prstGeom>
         </p:spPr>
       </p:pic>
+      <p:sp>
+        <p:nvSpPr>
+          <p:cNvPr id="2" name="Прямоугольник 1"/>
+          <p:cNvSpPr/>
+          <p:nvPr/>
+        </p:nvSpPr>
+        <p:spPr>
+          <a:xfrm>
+            <a:off x="2953400" y="5236478"/>
+            <a:ext cx="6096000" cy="923330"/>
+          </a:xfrm>
+          <a:prstGeom prst="rect">
+            <a:avLst/>
+          </a:prstGeom>
+        </p:spPr>
+        <p:txBody>
+          <a:bodyPr>
+            <a:spAutoFit/>
+          </a:bodyPr>
+          <a:lstStyle/>
+          <a:p>
+            <a:r>
+              <a:rPr lang="ru-RU" dirty="0" smtClean="0"/>
+              <a:t>Отдельно вы можете на </a:t>
+            </a:r>
+            <a:r>
+              <a:rPr lang="ru-RU" dirty="0" err="1" smtClean="0"/>
+              <a:t>гитхабе</a:t>
+            </a:r>
+            <a:r>
+              <a:rPr lang="ru-RU" dirty="0" smtClean="0"/>
+              <a:t> увидеть ветку с </a:t>
+            </a:r>
+            <a:r>
+              <a:rPr lang="ru-RU" dirty="0" err="1" smtClean="0"/>
+              <a:t>коммитами</a:t>
+            </a:r>
+            <a:r>
+              <a:rPr lang="ru-RU" dirty="0" smtClean="0"/>
+              <a:t>. Нажмите на синюю ссылку слева и откроются ваши </a:t>
+            </a:r>
+            <a:r>
+              <a:rPr lang="ru-RU" dirty="0" err="1" smtClean="0"/>
+              <a:t>коммиты</a:t>
+            </a:r>
+            <a:endParaRPr lang="ru-RU" dirty="0"/>
+          </a:p>
+        </p:txBody>
+      </p:sp>
     </p:spTree>
     <p:extLst>
       <p:ext uri="{BB962C8B-B14F-4D97-AF65-F5344CB8AC3E}">
@@ -9781,7 +11537,7 @@
 </p:sld>
 </file>
 
-<file path=ppt/slides/slide24.xml><?xml version="1.0" encoding="utf-8"?>
+<file path=ppt/slides/slide26.xml><?xml version="1.0" encoding="utf-8"?>
 <p:sld xmlns:a="http://schemas.openxmlformats.org/drawingml/2006/main" xmlns:r="http://schemas.openxmlformats.org/officeDocument/2006/relationships" xmlns:p="http://schemas.openxmlformats.org/presentationml/2006/main">
   <p:cSld>
     <p:spTree>
@@ -9978,6 +11734,20 @@
               </a:rPr>
               <a:t>init</a:t>
             </a:r>
+            <a:r>
+              <a:rPr lang="ru-RU" sz="2400" dirty="0" smtClean="0">
+                <a:latin typeface="Times New Roman" panose="02020603050405020304" pitchFamily="18" charset="0"/>
+                <a:cs typeface="Times New Roman" panose="02020603050405020304" pitchFamily="18" charset="0"/>
+              </a:rPr>
+              <a:t> Инициализируем </a:t>
+            </a:r>
+            <a:r>
+              <a:rPr lang="ru-RU" sz="2400" dirty="0" err="1" smtClean="0">
+                <a:latin typeface="Times New Roman" panose="02020603050405020304" pitchFamily="18" charset="0"/>
+                <a:cs typeface="Times New Roman" panose="02020603050405020304" pitchFamily="18" charset="0"/>
+              </a:rPr>
+              <a:t>репозиторий</a:t>
+            </a:r>
             <a:endParaRPr lang="ru-RU" sz="3600" dirty="0">
               <a:latin typeface="Times New Roman" panose="02020603050405020304" pitchFamily="18" charset="0"/>
               <a:cs typeface="Times New Roman" panose="02020603050405020304" pitchFamily="18" charset="0"/>
@@ -10280,7 +12050,28 @@
                 <a:latin typeface="Times New Roman" panose="02020603050405020304" pitchFamily="18" charset="0"/>
                 <a:cs typeface="Times New Roman" panose="02020603050405020304" pitchFamily="18" charset="0"/>
               </a:rPr>
-              <a:t> clone</a:t>
+              <a:t> </a:t>
+            </a:r>
+            <a:r>
+              <a:rPr lang="en-US" sz="2400" dirty="0" smtClean="0">
+                <a:latin typeface="Times New Roman" panose="02020603050405020304" pitchFamily="18" charset="0"/>
+                <a:cs typeface="Times New Roman" panose="02020603050405020304" pitchFamily="18" charset="0"/>
+              </a:rPr>
+              <a:t>clone</a:t>
+            </a:r>
+            <a:r>
+              <a:rPr lang="ru-RU" sz="2400" dirty="0" smtClean="0">
+                <a:latin typeface="Times New Roman" panose="02020603050405020304" pitchFamily="18" charset="0"/>
+                <a:cs typeface="Times New Roman" panose="02020603050405020304" pitchFamily="18" charset="0"/>
+              </a:rPr>
+              <a:t> Клонируем удаленный </a:t>
+            </a:r>
+            <a:r>
+              <a:rPr lang="ru-RU" sz="2400" dirty="0" err="1" smtClean="0">
+                <a:latin typeface="Times New Roman" panose="02020603050405020304" pitchFamily="18" charset="0"/>
+                <a:cs typeface="Times New Roman" panose="02020603050405020304" pitchFamily="18" charset="0"/>
+              </a:rPr>
+              <a:t>репозиторий</a:t>
             </a:r>
             <a:endParaRPr lang="ru-RU" sz="3600" dirty="0">
               <a:latin typeface="Times New Roman" panose="02020603050405020304" pitchFamily="18" charset="0"/>
@@ -10557,7 +12348,21 @@
                 <a:latin typeface="Times New Roman" panose="02020603050405020304" pitchFamily="18" charset="0"/>
                 <a:cs typeface="Times New Roman" panose="02020603050405020304" pitchFamily="18" charset="0"/>
               </a:rPr>
-              <a:t> / .)</a:t>
+              <a:t> / </a:t>
+            </a:r>
+            <a:r>
+              <a:rPr lang="ru-RU" sz="2400" dirty="0" smtClean="0">
+                <a:latin typeface="Times New Roman" panose="02020603050405020304" pitchFamily="18" charset="0"/>
+                <a:cs typeface="Times New Roman" panose="02020603050405020304" pitchFamily="18" charset="0"/>
+              </a:rPr>
+              <a:t>.) Добавляем изменения в </a:t>
+            </a:r>
+            <a:r>
+              <a:rPr lang="ru-RU" sz="2400" dirty="0" err="1" smtClean="0">
+                <a:latin typeface="Times New Roman" panose="02020603050405020304" pitchFamily="18" charset="0"/>
+                <a:cs typeface="Times New Roman" panose="02020603050405020304" pitchFamily="18" charset="0"/>
+              </a:rPr>
+              <a:t>репозиторий</a:t>
             </a:r>
             <a:endParaRPr lang="ru-RU" sz="3600" dirty="0">
               <a:latin typeface="Times New Roman" panose="02020603050405020304" pitchFamily="18" charset="0"/>
@@ -10813,7 +12618,28 @@
                 <a:latin typeface="Times New Roman" panose="02020603050405020304" pitchFamily="18" charset="0"/>
                 <a:cs typeface="Times New Roman" panose="02020603050405020304" pitchFamily="18" charset="0"/>
               </a:rPr>
-              <a:t> push</a:t>
+              <a:t> </a:t>
+            </a:r>
+            <a:r>
+              <a:rPr lang="en-US" sz="2400" dirty="0" smtClean="0">
+                <a:latin typeface="Times New Roman" panose="02020603050405020304" pitchFamily="18" charset="0"/>
+                <a:cs typeface="Times New Roman" panose="02020603050405020304" pitchFamily="18" charset="0"/>
+              </a:rPr>
+              <a:t>push</a:t>
+            </a:r>
+            <a:r>
+              <a:rPr lang="ru-RU" sz="2400" dirty="0" smtClean="0">
+                <a:latin typeface="Times New Roman" panose="02020603050405020304" pitchFamily="18" charset="0"/>
+                <a:cs typeface="Times New Roman" panose="02020603050405020304" pitchFamily="18" charset="0"/>
+              </a:rPr>
+              <a:t> Отправляем изменения в удаленный </a:t>
+            </a:r>
+            <a:r>
+              <a:rPr lang="ru-RU" sz="2400" dirty="0" err="1" smtClean="0">
+                <a:latin typeface="Times New Roman" panose="02020603050405020304" pitchFamily="18" charset="0"/>
+                <a:cs typeface="Times New Roman" panose="02020603050405020304" pitchFamily="18" charset="0"/>
+              </a:rPr>
+              <a:t>репозиторий</a:t>
             </a:r>
             <a:endParaRPr lang="ru-RU" sz="3600" dirty="0">
               <a:latin typeface="Times New Roman" panose="02020603050405020304" pitchFamily="18" charset="0"/>
@@ -11069,7 +12895,35 @@
                 <a:latin typeface="Times New Roman" panose="02020603050405020304" pitchFamily="18" charset="0"/>
                 <a:cs typeface="Times New Roman" panose="02020603050405020304" pitchFamily="18" charset="0"/>
               </a:rPr>
-              <a:t> pull</a:t>
+              <a:t> </a:t>
+            </a:r>
+            <a:r>
+              <a:rPr lang="en-US" sz="2400" dirty="0" smtClean="0">
+                <a:latin typeface="Times New Roman" panose="02020603050405020304" pitchFamily="18" charset="0"/>
+                <a:cs typeface="Times New Roman" panose="02020603050405020304" pitchFamily="18" charset="0"/>
+              </a:rPr>
+              <a:t>pull</a:t>
+            </a:r>
+            <a:r>
+              <a:rPr lang="ru-RU" sz="2400" dirty="0" smtClean="0">
+                <a:latin typeface="Times New Roman" panose="02020603050405020304" pitchFamily="18" charset="0"/>
+                <a:cs typeface="Times New Roman" panose="02020603050405020304" pitchFamily="18" charset="0"/>
+              </a:rPr>
+              <a:t> Копируем все с удаленного </a:t>
+            </a:r>
+            <a:r>
+              <a:rPr lang="ru-RU" sz="2400" dirty="0" err="1" smtClean="0">
+                <a:latin typeface="Times New Roman" panose="02020603050405020304" pitchFamily="18" charset="0"/>
+                <a:cs typeface="Times New Roman" panose="02020603050405020304" pitchFamily="18" charset="0"/>
+              </a:rPr>
+              <a:t>репозитория</a:t>
+            </a:r>
+            <a:r>
+              <a:rPr lang="ru-RU" sz="2400" dirty="0" smtClean="0">
+                <a:latin typeface="Times New Roman" panose="02020603050405020304" pitchFamily="18" charset="0"/>
+                <a:cs typeface="Times New Roman" panose="02020603050405020304" pitchFamily="18" charset="0"/>
+              </a:rPr>
+              <a:t> и вставляем в локальный</a:t>
             </a:r>
             <a:endParaRPr lang="ru-RU" sz="3600" dirty="0">
               <a:latin typeface="Times New Roman" panose="02020603050405020304" pitchFamily="18" charset="0"/>
@@ -11339,7 +13193,28 @@
                 <a:latin typeface="Times New Roman" panose="02020603050405020304" pitchFamily="18" charset="0"/>
                 <a:cs typeface="Times New Roman" panose="02020603050405020304" pitchFamily="18" charset="0"/>
               </a:rPr>
-              <a:t> commit –m)</a:t>
+              <a:t> commit –m</a:t>
+            </a:r>
+            <a:r>
+              <a:rPr lang="en-US" sz="2400" dirty="0" smtClean="0">
+                <a:latin typeface="Times New Roman" panose="02020603050405020304" pitchFamily="18" charset="0"/>
+                <a:cs typeface="Times New Roman" panose="02020603050405020304" pitchFamily="18" charset="0"/>
+              </a:rPr>
+              <a:t>)</a:t>
+            </a:r>
+            <a:r>
+              <a:rPr lang="ru-RU" sz="2400" dirty="0" smtClean="0">
+                <a:latin typeface="Times New Roman" panose="02020603050405020304" pitchFamily="18" charset="0"/>
+                <a:cs typeface="Times New Roman" panose="02020603050405020304" pitchFamily="18" charset="0"/>
+              </a:rPr>
+              <a:t> Делаем </a:t>
+            </a:r>
+            <a:r>
+              <a:rPr lang="ru-RU" sz="2400" dirty="0" err="1" smtClean="0">
+                <a:latin typeface="Times New Roman" panose="02020603050405020304" pitchFamily="18" charset="0"/>
+                <a:cs typeface="Times New Roman" panose="02020603050405020304" pitchFamily="18" charset="0"/>
+              </a:rPr>
+              <a:t>коммит</a:t>
             </a:r>
             <a:endParaRPr lang="ru-RU" sz="3600" dirty="0">
               <a:latin typeface="Times New Roman" panose="02020603050405020304" pitchFamily="18" charset="0"/>
@@ -11595,7 +13470,21 @@
                 <a:latin typeface="Times New Roman" panose="02020603050405020304" pitchFamily="18" charset="0"/>
                 <a:cs typeface="Times New Roman" panose="02020603050405020304" pitchFamily="18" charset="0"/>
               </a:rPr>
-              <a:t> checkout</a:t>
+              <a:t> </a:t>
+            </a:r>
+            <a:r>
+              <a:rPr lang="en-US" sz="2400" dirty="0" smtClean="0">
+                <a:latin typeface="Times New Roman" panose="02020603050405020304" pitchFamily="18" charset="0"/>
+                <a:cs typeface="Times New Roman" panose="02020603050405020304" pitchFamily="18" charset="0"/>
+              </a:rPr>
+              <a:t>checkout</a:t>
+            </a:r>
+            <a:r>
+              <a:rPr lang="ru-RU" sz="2400" dirty="0" smtClean="0">
+                <a:latin typeface="Times New Roman" panose="02020603050405020304" pitchFamily="18" charset="0"/>
+                <a:cs typeface="Times New Roman" panose="02020603050405020304" pitchFamily="18" charset="0"/>
+              </a:rPr>
+              <a:t> Для перехода с ветки на ветку</a:t>
             </a:r>
             <a:endParaRPr lang="ru-RU" sz="3600" dirty="0">
               <a:latin typeface="Times New Roman" panose="02020603050405020304" pitchFamily="18" charset="0"/>
@@ -11851,7 +13740,35 @@
                 <a:latin typeface="Times New Roman" panose="02020603050405020304" pitchFamily="18" charset="0"/>
                 <a:cs typeface="Times New Roman" panose="02020603050405020304" pitchFamily="18" charset="0"/>
               </a:rPr>
-              <a:t> status</a:t>
+              <a:t> </a:t>
+            </a:r>
+            <a:r>
+              <a:rPr lang="en-US" sz="2400" dirty="0" smtClean="0">
+                <a:latin typeface="Times New Roman" panose="02020603050405020304" pitchFamily="18" charset="0"/>
+                <a:cs typeface="Times New Roman" panose="02020603050405020304" pitchFamily="18" charset="0"/>
+              </a:rPr>
+              <a:t>status</a:t>
+            </a:r>
+            <a:r>
+              <a:rPr lang="ru-RU" sz="2400" dirty="0" smtClean="0">
+                <a:latin typeface="Times New Roman" panose="02020603050405020304" pitchFamily="18" charset="0"/>
+                <a:cs typeface="Times New Roman" panose="02020603050405020304" pitchFamily="18" charset="0"/>
+              </a:rPr>
+              <a:t> Проверка состояния </a:t>
+            </a:r>
+            <a:r>
+              <a:rPr lang="ru-RU" sz="2400" dirty="0" err="1" smtClean="0">
+                <a:latin typeface="Times New Roman" panose="02020603050405020304" pitchFamily="18" charset="0"/>
+                <a:cs typeface="Times New Roman" panose="02020603050405020304" pitchFamily="18" charset="0"/>
+              </a:rPr>
+              <a:t>репозитория</a:t>
+            </a:r>
+            <a:r>
+              <a:rPr lang="ru-RU" sz="2400" dirty="0" smtClean="0">
+                <a:latin typeface="Times New Roman" panose="02020603050405020304" pitchFamily="18" charset="0"/>
+                <a:cs typeface="Times New Roman" panose="02020603050405020304" pitchFamily="18" charset="0"/>
+              </a:rPr>
+              <a:t> и изменений в нем</a:t>
             </a:r>
             <a:endParaRPr lang="ru-RU" sz="3600" dirty="0">
               <a:latin typeface="Times New Roman" panose="02020603050405020304" pitchFamily="18" charset="0"/>
@@ -12100,14 +14017,21 @@
                 <a:latin typeface="Times New Roman" panose="02020603050405020304" pitchFamily="18" charset="0"/>
                 <a:cs typeface="Times New Roman" panose="02020603050405020304" pitchFamily="18" charset="0"/>
               </a:rPr>
-              <a:t>git</a:t>
-            </a:r>
-            <a:r>
-              <a:rPr lang="en-US" sz="2400" dirty="0" err="1">
-                <a:latin typeface="Times New Roman" panose="02020603050405020304" pitchFamily="18" charset="0"/>
-                <a:cs typeface="Times New Roman" panose="02020603050405020304" pitchFamily="18" charset="0"/>
-              </a:rPr>
-              <a:t>k</a:t>
+              <a:t>gitk</a:t>
+            </a:r>
+            <a:r>
+              <a:rPr lang="ru-RU" sz="2400" dirty="0" smtClean="0">
+                <a:latin typeface="Times New Roman" panose="02020603050405020304" pitchFamily="18" charset="0"/>
+                <a:cs typeface="Times New Roman" panose="02020603050405020304" pitchFamily="18" charset="0"/>
+              </a:rPr>
+              <a:t> Наглядно смотрим на дерево веток и </a:t>
+            </a:r>
+            <a:r>
+              <a:rPr lang="ru-RU" sz="2400" dirty="0" err="1" smtClean="0">
+                <a:latin typeface="Times New Roman" panose="02020603050405020304" pitchFamily="18" charset="0"/>
+                <a:cs typeface="Times New Roman" panose="02020603050405020304" pitchFamily="18" charset="0"/>
+              </a:rPr>
+              <a:t>коммитов</a:t>
             </a:r>
             <a:endParaRPr lang="ru-RU" sz="3600" dirty="0">
               <a:latin typeface="Times New Roman" panose="02020603050405020304" pitchFamily="18" charset="0"/>
@@ -12184,7 +14108,7 @@
 </p:sld>
 </file>
 
-<file path=ppt/slides/slide25.xml><?xml version="1.0" encoding="utf-8"?>
+<file path=ppt/slides/slide27.xml><?xml version="1.0" encoding="utf-8"?>
 <p:sld xmlns:a="http://schemas.openxmlformats.org/drawingml/2006/main" xmlns:r="http://schemas.openxmlformats.org/officeDocument/2006/relationships" xmlns:p="http://schemas.openxmlformats.org/presentationml/2006/main">
   <p:cSld>
     <p:spTree>
@@ -12349,13 +14273,13 @@
         </p:nvSpPr>
         <p:spPr>
           <a:xfrm>
-            <a:off x="1813549" y="1847486"/>
-            <a:ext cx="9766451" cy="433605"/>
+            <a:off x="1813548" y="1847486"/>
+            <a:ext cx="10378451" cy="433605"/>
           </a:xfrm>
         </p:spPr>
         <p:txBody>
           <a:bodyPr>
-            <a:normAutofit/>
+            <a:normAutofit fontScale="92500"/>
           </a:bodyPr>
           <a:lstStyle/>
           <a:p>
@@ -12386,7 +14310,28 @@
                 <a:latin typeface="Times New Roman" panose="02020603050405020304" pitchFamily="18" charset="0"/>
                 <a:cs typeface="Times New Roman" panose="02020603050405020304" pitchFamily="18" charset="0"/>
               </a:rPr>
-              <a:t> branch –d / -a)</a:t>
+              <a:t> branch –d / -a</a:t>
+            </a:r>
+            <a:r>
+              <a:rPr lang="en-US" sz="2400" dirty="0" smtClean="0">
+                <a:latin typeface="Times New Roman" panose="02020603050405020304" pitchFamily="18" charset="0"/>
+                <a:cs typeface="Times New Roman" panose="02020603050405020304" pitchFamily="18" charset="0"/>
+              </a:rPr>
+              <a:t>)</a:t>
+            </a:r>
+            <a:r>
+              <a:rPr lang="ru-RU" sz="2400" dirty="0" smtClean="0">
+                <a:latin typeface="Times New Roman" panose="02020603050405020304" pitchFamily="18" charset="0"/>
+                <a:cs typeface="Times New Roman" panose="02020603050405020304" pitchFamily="18" charset="0"/>
+              </a:rPr>
+              <a:t> Смотрим на ветки/создаем ветки/переименовываем и </a:t>
+            </a:r>
+            <a:r>
+              <a:rPr lang="ru-RU" sz="2400" dirty="0" err="1" smtClean="0">
+                <a:latin typeface="Times New Roman" panose="02020603050405020304" pitchFamily="18" charset="0"/>
+                <a:cs typeface="Times New Roman" panose="02020603050405020304" pitchFamily="18" charset="0"/>
+              </a:rPr>
+              <a:t>пр</a:t>
             </a:r>
             <a:endParaRPr lang="ru-RU" sz="3600" dirty="0">
               <a:latin typeface="Times New Roman" panose="02020603050405020304" pitchFamily="18" charset="0"/>
@@ -12704,7 +14649,28 @@
                 <a:latin typeface="Times New Roman" panose="02020603050405020304" pitchFamily="18" charset="0"/>
                 <a:cs typeface="Times New Roman" panose="02020603050405020304" pitchFamily="18" charset="0"/>
               </a:rPr>
-              <a:t> log –p)</a:t>
+              <a:t> log –p</a:t>
+            </a:r>
+            <a:r>
+              <a:rPr lang="en-US" sz="2400" dirty="0" smtClean="0">
+                <a:latin typeface="Times New Roman" panose="02020603050405020304" pitchFamily="18" charset="0"/>
+                <a:cs typeface="Times New Roman" panose="02020603050405020304" pitchFamily="18" charset="0"/>
+              </a:rPr>
+              <a:t>)</a:t>
+            </a:r>
+            <a:r>
+              <a:rPr lang="ru-RU" sz="2400" dirty="0" smtClean="0">
+                <a:latin typeface="Times New Roman" panose="02020603050405020304" pitchFamily="18" charset="0"/>
+                <a:cs typeface="Times New Roman" panose="02020603050405020304" pitchFamily="18" charset="0"/>
+              </a:rPr>
+              <a:t> Смотрим на список </a:t>
+            </a:r>
+            <a:r>
+              <a:rPr lang="ru-RU" sz="2400" dirty="0" err="1" smtClean="0">
+                <a:latin typeface="Times New Roman" panose="02020603050405020304" pitchFamily="18" charset="0"/>
+                <a:cs typeface="Times New Roman" panose="02020603050405020304" pitchFamily="18" charset="0"/>
+              </a:rPr>
+              <a:t>коммитов</a:t>
             </a:r>
             <a:endParaRPr lang="ru-RU" sz="3600" dirty="0">
               <a:latin typeface="Times New Roman" panose="02020603050405020304" pitchFamily="18" charset="0"/>
@@ -12974,7 +14940,28 @@
                 <a:latin typeface="Times New Roman" panose="02020603050405020304" pitchFamily="18" charset="0"/>
                 <a:cs typeface="Times New Roman" panose="02020603050405020304" pitchFamily="18" charset="0"/>
               </a:rPr>
-              <a:t> diff --staged)</a:t>
+              <a:t> diff --staged</a:t>
+            </a:r>
+            <a:r>
+              <a:rPr lang="en-US" sz="2400" dirty="0" smtClean="0">
+                <a:latin typeface="Times New Roman" panose="02020603050405020304" pitchFamily="18" charset="0"/>
+                <a:cs typeface="Times New Roman" panose="02020603050405020304" pitchFamily="18" charset="0"/>
+              </a:rPr>
+              <a:t>) </a:t>
+            </a:r>
+            <a:r>
+              <a:rPr lang="ru-RU" sz="2400" dirty="0" smtClean="0">
+                <a:latin typeface="Times New Roman" panose="02020603050405020304" pitchFamily="18" charset="0"/>
+                <a:cs typeface="Times New Roman" panose="02020603050405020304" pitchFamily="18" charset="0"/>
+              </a:rPr>
+              <a:t>Просматриваем разницу между </a:t>
+            </a:r>
+            <a:r>
+              <a:rPr lang="ru-RU" sz="2400" dirty="0" err="1" smtClean="0">
+                <a:latin typeface="Times New Roman" panose="02020603050405020304" pitchFamily="18" charset="0"/>
+                <a:cs typeface="Times New Roman" panose="02020603050405020304" pitchFamily="18" charset="0"/>
+              </a:rPr>
+              <a:t>коммитами</a:t>
             </a:r>
             <a:endParaRPr lang="ru-RU" sz="3600" dirty="0">
               <a:latin typeface="Times New Roman" panose="02020603050405020304" pitchFamily="18" charset="0"/>
@@ -13272,7 +15259,21 @@
                 <a:latin typeface="Times New Roman" panose="02020603050405020304" pitchFamily="18" charset="0"/>
                 <a:cs typeface="Times New Roman" panose="02020603050405020304" pitchFamily="18" charset="0"/>
               </a:rPr>
-              <a:t>&gt;)</a:t>
+              <a:t>&gt;) </a:t>
+            </a:r>
+            <a:r>
+              <a:rPr lang="ru-RU" sz="2400" dirty="0" smtClean="0">
+                <a:latin typeface="Times New Roman" panose="02020603050405020304" pitchFamily="18" charset="0"/>
+                <a:cs typeface="Times New Roman" panose="02020603050405020304" pitchFamily="18" charset="0"/>
+              </a:rPr>
+              <a:t>Удалить ветку/файлы и </a:t>
+            </a:r>
+            <a:r>
+              <a:rPr lang="ru-RU" sz="2400" dirty="0" err="1" smtClean="0">
+                <a:latin typeface="Times New Roman" panose="02020603050405020304" pitchFamily="18" charset="0"/>
+                <a:cs typeface="Times New Roman" panose="02020603050405020304" pitchFamily="18" charset="0"/>
+              </a:rPr>
+              <a:t>пр</a:t>
             </a:r>
             <a:endParaRPr lang="ru-RU" sz="3600" dirty="0">
               <a:latin typeface="Times New Roman" panose="02020603050405020304" pitchFamily="18" charset="0"/>
@@ -13528,7 +15529,21 @@
                 <a:latin typeface="Times New Roman" panose="02020603050405020304" pitchFamily="18" charset="0"/>
                 <a:cs typeface="Times New Roman" panose="02020603050405020304" pitchFamily="18" charset="0"/>
               </a:rPr>
-              <a:t> mv</a:t>
+              <a:t> </a:t>
+            </a:r>
+            <a:r>
+              <a:rPr lang="en-US" sz="2400" dirty="0" smtClean="0">
+                <a:latin typeface="Times New Roman" panose="02020603050405020304" pitchFamily="18" charset="0"/>
+                <a:cs typeface="Times New Roman" panose="02020603050405020304" pitchFamily="18" charset="0"/>
+              </a:rPr>
+              <a:t>mv </a:t>
+            </a:r>
+            <a:r>
+              <a:rPr lang="ru-RU" sz="2400" dirty="0" smtClean="0">
+                <a:latin typeface="Times New Roman" panose="02020603050405020304" pitchFamily="18" charset="0"/>
+                <a:cs typeface="Times New Roman" panose="02020603050405020304" pitchFamily="18" charset="0"/>
+              </a:rPr>
+              <a:t>Перемещаем файлы</a:t>
             </a:r>
             <a:endParaRPr lang="ru-RU" sz="3600" dirty="0">
               <a:latin typeface="Times New Roman" panose="02020603050405020304" pitchFamily="18" charset="0"/>
@@ -13784,7 +15799,21 @@
                 <a:latin typeface="Times New Roman" panose="02020603050405020304" pitchFamily="18" charset="0"/>
                 <a:cs typeface="Times New Roman" panose="02020603050405020304" pitchFamily="18" charset="0"/>
               </a:rPr>
-              <a:t> reset</a:t>
+              <a:t> </a:t>
+            </a:r>
+            <a:r>
+              <a:rPr lang="en-US" sz="2400" dirty="0" smtClean="0">
+                <a:latin typeface="Times New Roman" panose="02020603050405020304" pitchFamily="18" charset="0"/>
+                <a:cs typeface="Times New Roman" panose="02020603050405020304" pitchFamily="18" charset="0"/>
+              </a:rPr>
+              <a:t>reset </a:t>
+            </a:r>
+            <a:r>
+              <a:rPr lang="ru-RU" sz="2400" dirty="0" smtClean="0">
+                <a:latin typeface="Times New Roman" panose="02020603050405020304" pitchFamily="18" charset="0"/>
+                <a:cs typeface="Times New Roman" panose="02020603050405020304" pitchFamily="18" charset="0"/>
+              </a:rPr>
+              <a:t>Сброс в заданное состояние</a:t>
             </a:r>
             <a:endParaRPr lang="ru-RU" sz="3600" dirty="0">
               <a:latin typeface="Times New Roman" panose="02020603050405020304" pitchFamily="18" charset="0"/>
@@ -13860,7 +15889,7 @@
         </p:spPr>
         <p:txBody>
           <a:bodyPr vert="horz" lIns="91440" tIns="45720" rIns="91440" bIns="45720" rtlCol="0">
-            <a:normAutofit/>
+            <a:normAutofit fontScale="92500"/>
           </a:bodyPr>
           <a:lstStyle>
             <a:lvl1pPr marL="0" indent="0" algn="l" defTabSz="914400" rtl="0" eaLnBrk="1" latinLnBrk="0" hangingPunct="1">
@@ -14040,7 +16069,35 @@
                 <a:latin typeface="Times New Roman" panose="02020603050405020304" pitchFamily="18" charset="0"/>
                 <a:cs typeface="Times New Roman" panose="02020603050405020304" pitchFamily="18" charset="0"/>
               </a:rPr>
-              <a:t> revert</a:t>
+              <a:t> </a:t>
+            </a:r>
+            <a:r>
+              <a:rPr lang="en-US" sz="2400" dirty="0" smtClean="0">
+                <a:latin typeface="Times New Roman" panose="02020603050405020304" pitchFamily="18" charset="0"/>
+                <a:cs typeface="Times New Roman" panose="02020603050405020304" pitchFamily="18" charset="0"/>
+              </a:rPr>
+              <a:t>revert </a:t>
+            </a:r>
+            <a:r>
+              <a:rPr lang="ru-RU" sz="2400" dirty="0" smtClean="0">
+                <a:latin typeface="Times New Roman" panose="02020603050405020304" pitchFamily="18" charset="0"/>
+                <a:cs typeface="Times New Roman" panose="02020603050405020304" pitchFamily="18" charset="0"/>
+              </a:rPr>
+              <a:t>Отмена операции, создает новый </a:t>
+            </a:r>
+            <a:r>
+              <a:rPr lang="ru-RU" sz="2400" dirty="0" err="1" smtClean="0">
+                <a:latin typeface="Times New Roman" panose="02020603050405020304" pitchFamily="18" charset="0"/>
+                <a:cs typeface="Times New Roman" panose="02020603050405020304" pitchFamily="18" charset="0"/>
+              </a:rPr>
+              <a:t>коммит</a:t>
+            </a:r>
+            <a:r>
+              <a:rPr lang="ru-RU" sz="2400" dirty="0" smtClean="0">
+                <a:latin typeface="Times New Roman" panose="02020603050405020304" pitchFamily="18" charset="0"/>
+                <a:cs typeface="Times New Roman" panose="02020603050405020304" pitchFamily="18" charset="0"/>
+              </a:rPr>
+              <a:t> с отмененными операциями</a:t>
             </a:r>
             <a:endParaRPr lang="ru-RU" sz="3600" dirty="0">
               <a:latin typeface="Times New Roman" panose="02020603050405020304" pitchFamily="18" charset="0"/>
@@ -14296,7 +16353,21 @@
                 <a:latin typeface="Times New Roman" panose="02020603050405020304" pitchFamily="18" charset="0"/>
                 <a:cs typeface="Times New Roman" panose="02020603050405020304" pitchFamily="18" charset="0"/>
               </a:rPr>
-              <a:t> marge</a:t>
+              <a:t> </a:t>
+            </a:r>
+            <a:r>
+              <a:rPr lang="en-US" sz="2400" dirty="0" smtClean="0">
+                <a:latin typeface="Times New Roman" panose="02020603050405020304" pitchFamily="18" charset="0"/>
+                <a:cs typeface="Times New Roman" panose="02020603050405020304" pitchFamily="18" charset="0"/>
+              </a:rPr>
+              <a:t>marge</a:t>
+            </a:r>
+            <a:r>
+              <a:rPr lang="ru-RU" sz="2400" dirty="0" smtClean="0">
+                <a:latin typeface="Times New Roman" panose="02020603050405020304" pitchFamily="18" charset="0"/>
+                <a:cs typeface="Times New Roman" panose="02020603050405020304" pitchFamily="18" charset="0"/>
+              </a:rPr>
+              <a:t> Соединяем ветки</a:t>
             </a:r>
             <a:endParaRPr lang="ru-RU" sz="3600" dirty="0">
               <a:latin typeface="Times New Roman" panose="02020603050405020304" pitchFamily="18" charset="0"/>
@@ -14552,7 +16623,21 @@
                 <a:latin typeface="Times New Roman" panose="02020603050405020304" pitchFamily="18" charset="0"/>
                 <a:cs typeface="Times New Roman" panose="02020603050405020304" pitchFamily="18" charset="0"/>
               </a:rPr>
-              <a:t> help</a:t>
+              <a:t> </a:t>
+            </a:r>
+            <a:r>
+              <a:rPr lang="en-US" sz="2400" dirty="0" smtClean="0">
+                <a:latin typeface="Times New Roman" panose="02020603050405020304" pitchFamily="18" charset="0"/>
+                <a:cs typeface="Times New Roman" panose="02020603050405020304" pitchFamily="18" charset="0"/>
+              </a:rPr>
+              <a:t>help</a:t>
+            </a:r>
+            <a:r>
+              <a:rPr lang="ru-RU" sz="2400" dirty="0" smtClean="0">
+                <a:latin typeface="Times New Roman" panose="02020603050405020304" pitchFamily="18" charset="0"/>
+                <a:cs typeface="Times New Roman" panose="02020603050405020304" pitchFamily="18" charset="0"/>
+              </a:rPr>
+              <a:t> Смотрим на список команд</a:t>
             </a:r>
             <a:endParaRPr lang="ru-RU" sz="3600" dirty="0">
               <a:latin typeface="Times New Roman" panose="02020603050405020304" pitchFamily="18" charset="0"/>
@@ -14609,6 +16694,297 @@
           </a:p>
         </p:txBody>
       </p:sp>
+      <p:sp>
+        <p:nvSpPr>
+          <p:cNvPr id="35" name="Текст 11"/>
+          <p:cNvSpPr txBox="1">
+            <a:spLocks/>
+          </p:cNvSpPr>
+          <p:nvPr/>
+        </p:nvSpPr>
+        <p:spPr>
+          <a:xfrm>
+            <a:off x="1813549" y="6207592"/>
+            <a:ext cx="9766451" cy="433605"/>
+          </a:xfrm>
+          <a:prstGeom prst="rect">
+            <a:avLst/>
+          </a:prstGeom>
+        </p:spPr>
+        <p:txBody>
+          <a:bodyPr vert="horz" lIns="91440" tIns="45720" rIns="91440" bIns="45720" rtlCol="0">
+            <a:normAutofit/>
+          </a:bodyPr>
+          <a:lstStyle>
+            <a:lvl1pPr marL="0" indent="0" algn="l" defTabSz="914400" rtl="0" eaLnBrk="1" latinLnBrk="0" hangingPunct="1">
+              <a:lnSpc>
+                <a:spcPct val="90000"/>
+              </a:lnSpc>
+              <a:spcBef>
+                <a:spcPts val="1000"/>
+              </a:spcBef>
+              <a:buFont typeface="Arial" panose="020B0604020202020204" pitchFamily="34" charset="0"/>
+              <a:buNone/>
+              <a:defRPr sz="1600" kern="1200">
+                <a:solidFill>
+                  <a:schemeClr val="tx1"/>
+                </a:solidFill>
+                <a:latin typeface="+mn-lt"/>
+                <a:ea typeface="+mn-ea"/>
+                <a:cs typeface="+mn-cs"/>
+              </a:defRPr>
+            </a:lvl1pPr>
+            <a:lvl2pPr marL="457200" indent="0" algn="l" defTabSz="914400" rtl="0" eaLnBrk="1" latinLnBrk="0" hangingPunct="1">
+              <a:lnSpc>
+                <a:spcPct val="90000"/>
+              </a:lnSpc>
+              <a:spcBef>
+                <a:spcPts val="500"/>
+              </a:spcBef>
+              <a:buFont typeface="Arial" panose="020B0604020202020204" pitchFamily="34" charset="0"/>
+              <a:buNone/>
+              <a:defRPr sz="1400" kern="1200">
+                <a:solidFill>
+                  <a:schemeClr val="tx1"/>
+                </a:solidFill>
+                <a:latin typeface="+mn-lt"/>
+                <a:ea typeface="+mn-ea"/>
+                <a:cs typeface="+mn-cs"/>
+              </a:defRPr>
+            </a:lvl2pPr>
+            <a:lvl3pPr marL="914400" indent="0" algn="l" defTabSz="914400" rtl="0" eaLnBrk="1" latinLnBrk="0" hangingPunct="1">
+              <a:lnSpc>
+                <a:spcPct val="90000"/>
+              </a:lnSpc>
+              <a:spcBef>
+                <a:spcPts val="500"/>
+              </a:spcBef>
+              <a:buFont typeface="Arial" panose="020B0604020202020204" pitchFamily="34" charset="0"/>
+              <a:buNone/>
+              <a:defRPr sz="1200" kern="1200">
+                <a:solidFill>
+                  <a:schemeClr val="tx1"/>
+                </a:solidFill>
+                <a:latin typeface="+mn-lt"/>
+                <a:ea typeface="+mn-ea"/>
+                <a:cs typeface="+mn-cs"/>
+              </a:defRPr>
+            </a:lvl3pPr>
+            <a:lvl4pPr marL="1371600" indent="0" algn="l" defTabSz="914400" rtl="0" eaLnBrk="1" latinLnBrk="0" hangingPunct="1">
+              <a:lnSpc>
+                <a:spcPct val="90000"/>
+              </a:lnSpc>
+              <a:spcBef>
+                <a:spcPts val="500"/>
+              </a:spcBef>
+              <a:buFont typeface="Arial" panose="020B0604020202020204" pitchFamily="34" charset="0"/>
+              <a:buNone/>
+              <a:defRPr sz="1000" kern="1200">
+                <a:solidFill>
+                  <a:schemeClr val="tx1"/>
+                </a:solidFill>
+                <a:latin typeface="+mn-lt"/>
+                <a:ea typeface="+mn-ea"/>
+                <a:cs typeface="+mn-cs"/>
+              </a:defRPr>
+            </a:lvl4pPr>
+            <a:lvl5pPr marL="1828800" indent="0" algn="l" defTabSz="914400" rtl="0" eaLnBrk="1" latinLnBrk="0" hangingPunct="1">
+              <a:lnSpc>
+                <a:spcPct val="90000"/>
+              </a:lnSpc>
+              <a:spcBef>
+                <a:spcPts val="500"/>
+              </a:spcBef>
+              <a:buFont typeface="Arial" panose="020B0604020202020204" pitchFamily="34" charset="0"/>
+              <a:buNone/>
+              <a:defRPr sz="1000" kern="1200">
+                <a:solidFill>
+                  <a:schemeClr val="tx1"/>
+                </a:solidFill>
+                <a:latin typeface="+mn-lt"/>
+                <a:ea typeface="+mn-ea"/>
+                <a:cs typeface="+mn-cs"/>
+              </a:defRPr>
+            </a:lvl5pPr>
+            <a:lvl6pPr marL="2286000" indent="0" algn="l" defTabSz="914400" rtl="0" eaLnBrk="1" latinLnBrk="0" hangingPunct="1">
+              <a:lnSpc>
+                <a:spcPct val="90000"/>
+              </a:lnSpc>
+              <a:spcBef>
+                <a:spcPts val="500"/>
+              </a:spcBef>
+              <a:buFont typeface="Arial" panose="020B0604020202020204" pitchFamily="34" charset="0"/>
+              <a:buNone/>
+              <a:defRPr sz="1000" kern="1200">
+                <a:solidFill>
+                  <a:schemeClr val="tx1"/>
+                </a:solidFill>
+                <a:latin typeface="+mn-lt"/>
+                <a:ea typeface="+mn-ea"/>
+                <a:cs typeface="+mn-cs"/>
+              </a:defRPr>
+            </a:lvl6pPr>
+            <a:lvl7pPr marL="2743200" indent="0" algn="l" defTabSz="914400" rtl="0" eaLnBrk="1" latinLnBrk="0" hangingPunct="1">
+              <a:lnSpc>
+                <a:spcPct val="90000"/>
+              </a:lnSpc>
+              <a:spcBef>
+                <a:spcPts val="500"/>
+              </a:spcBef>
+              <a:buFont typeface="Arial" panose="020B0604020202020204" pitchFamily="34" charset="0"/>
+              <a:buNone/>
+              <a:defRPr sz="1000" kern="1200">
+                <a:solidFill>
+                  <a:schemeClr val="tx1"/>
+                </a:solidFill>
+                <a:latin typeface="+mn-lt"/>
+                <a:ea typeface="+mn-ea"/>
+                <a:cs typeface="+mn-cs"/>
+              </a:defRPr>
+            </a:lvl7pPr>
+            <a:lvl8pPr marL="3200400" indent="0" algn="l" defTabSz="914400" rtl="0" eaLnBrk="1" latinLnBrk="0" hangingPunct="1">
+              <a:lnSpc>
+                <a:spcPct val="90000"/>
+              </a:lnSpc>
+              <a:spcBef>
+                <a:spcPts val="500"/>
+              </a:spcBef>
+              <a:buFont typeface="Arial" panose="020B0604020202020204" pitchFamily="34" charset="0"/>
+              <a:buNone/>
+              <a:defRPr sz="1000" kern="1200">
+                <a:solidFill>
+                  <a:schemeClr val="tx1"/>
+                </a:solidFill>
+                <a:latin typeface="+mn-lt"/>
+                <a:ea typeface="+mn-ea"/>
+                <a:cs typeface="+mn-cs"/>
+              </a:defRPr>
+            </a:lvl8pPr>
+            <a:lvl9pPr marL="3657600" indent="0" algn="l" defTabSz="914400" rtl="0" eaLnBrk="1" latinLnBrk="0" hangingPunct="1">
+              <a:lnSpc>
+                <a:spcPct val="90000"/>
+              </a:lnSpc>
+              <a:spcBef>
+                <a:spcPts val="500"/>
+              </a:spcBef>
+              <a:buFont typeface="Arial" panose="020B0604020202020204" pitchFamily="34" charset="0"/>
+              <a:buNone/>
+              <a:defRPr sz="1000" kern="1200">
+                <a:solidFill>
+                  <a:schemeClr val="tx1"/>
+                </a:solidFill>
+                <a:latin typeface="+mn-lt"/>
+                <a:ea typeface="+mn-ea"/>
+                <a:cs typeface="+mn-cs"/>
+              </a:defRPr>
+            </a:lvl9pPr>
+          </a:lstStyle>
+          <a:p>
+            <a:pPr algn="just"/>
+            <a:r>
+              <a:rPr lang="en-US" sz="2400" dirty="0" err="1" smtClean="0">
+                <a:latin typeface="Times New Roman" panose="02020603050405020304" pitchFamily="18" charset="0"/>
+                <a:cs typeface="Times New Roman" panose="02020603050405020304" pitchFamily="18" charset="0"/>
+              </a:rPr>
+              <a:t>git</a:t>
+            </a:r>
+            <a:r>
+              <a:rPr lang="en-US" sz="2400" dirty="0" smtClean="0">
+                <a:latin typeface="Times New Roman" panose="02020603050405020304" pitchFamily="18" charset="0"/>
+                <a:cs typeface="Times New Roman" panose="02020603050405020304" pitchFamily="18" charset="0"/>
+              </a:rPr>
+              <a:t> </a:t>
+            </a:r>
+            <a:r>
+              <a:rPr lang="en-US" sz="2400" dirty="0" smtClean="0">
+                <a:latin typeface="Times New Roman" panose="02020603050405020304" pitchFamily="18" charset="0"/>
+                <a:cs typeface="Times New Roman" panose="02020603050405020304" pitchFamily="18" charset="0"/>
+              </a:rPr>
+              <a:t>fetch --all</a:t>
+            </a:r>
+            <a:r>
+              <a:rPr lang="ru-RU" sz="2400" dirty="0" smtClean="0">
+                <a:latin typeface="Times New Roman" panose="02020603050405020304" pitchFamily="18" charset="0"/>
+                <a:cs typeface="Times New Roman" panose="02020603050405020304" pitchFamily="18" charset="0"/>
+              </a:rPr>
+              <a:t> Обновляем </a:t>
+            </a:r>
+            <a:r>
+              <a:rPr lang="ru-RU" sz="2400" dirty="0" err="1" smtClean="0">
+                <a:latin typeface="Times New Roman" panose="02020603050405020304" pitchFamily="18" charset="0"/>
+                <a:cs typeface="Times New Roman" panose="02020603050405020304" pitchFamily="18" charset="0"/>
+              </a:rPr>
+              <a:t>репозиторий</a:t>
+            </a:r>
+            <a:r>
+              <a:rPr lang="ru-RU" sz="2400" dirty="0">
+                <a:latin typeface="Times New Roman" panose="02020603050405020304" pitchFamily="18" charset="0"/>
+                <a:cs typeface="Times New Roman" panose="02020603050405020304" pitchFamily="18" charset="0"/>
+              </a:rPr>
+              <a:t> </a:t>
+            </a:r>
+            <a:r>
+              <a:rPr lang="ru-RU" sz="2400" dirty="0" smtClean="0">
+                <a:latin typeface="Times New Roman" panose="02020603050405020304" pitchFamily="18" charset="0"/>
+                <a:cs typeface="Times New Roman" panose="02020603050405020304" pitchFamily="18" charset="0"/>
+              </a:rPr>
+              <a:t>в актуальное состояние</a:t>
+            </a:r>
+            <a:endParaRPr lang="ru-RU" sz="3600" dirty="0">
+              <a:latin typeface="Times New Roman" panose="02020603050405020304" pitchFamily="18" charset="0"/>
+              <a:cs typeface="Times New Roman" panose="02020603050405020304" pitchFamily="18" charset="0"/>
+            </a:endParaRPr>
+          </a:p>
+        </p:txBody>
+      </p:sp>
+      <p:sp>
+        <p:nvSpPr>
+          <p:cNvPr id="36" name="Прямоугольник 35"/>
+          <p:cNvSpPr>
+            <a:spLocks noChangeAspect="1"/>
+          </p:cNvSpPr>
+          <p:nvPr/>
+        </p:nvSpPr>
+        <p:spPr>
+          <a:xfrm>
+            <a:off x="1055825" y="6267446"/>
+            <a:ext cx="313899" cy="313899"/>
+          </a:xfrm>
+          <a:prstGeom prst="rect">
+            <a:avLst/>
+          </a:prstGeom>
+          <a:solidFill>
+            <a:srgbClr val="7030A0"/>
+          </a:solidFill>
+          <a:ln>
+            <a:noFill/>
+          </a:ln>
+        </p:spPr>
+        <p:style>
+          <a:lnRef idx="2">
+            <a:schemeClr val="accent1">
+              <a:shade val="50000"/>
+            </a:schemeClr>
+          </a:lnRef>
+          <a:fillRef idx="1">
+            <a:schemeClr val="accent1"/>
+          </a:fillRef>
+          <a:effectRef idx="0">
+            <a:schemeClr val="accent1"/>
+          </a:effectRef>
+          <a:fontRef idx="minor">
+            <a:schemeClr val="lt1"/>
+          </a:fontRef>
+        </p:style>
+        <p:txBody>
+          <a:bodyPr rtlCol="0" anchor="ctr"/>
+          <a:lstStyle/>
+          <a:p>
+            <a:pPr algn="ctr"/>
+            <a:endParaRPr lang="ru-RU"/>
+          </a:p>
+        </p:txBody>
+      </p:sp>
     </p:spTree>
     <p:extLst>
       <p:ext uri="{BB962C8B-B14F-4D97-AF65-F5344CB8AC3E}">
@@ -14629,7 +17005,7 @@
 </p:sld>
 </file>
 
-<file path=ppt/slides/slide26.xml><?xml version="1.0" encoding="utf-8"?>
+<file path=ppt/slides/slide28.xml><?xml version="1.0" encoding="utf-8"?>
 <p:sld xmlns:a="http://schemas.openxmlformats.org/drawingml/2006/main" xmlns:r="http://schemas.openxmlformats.org/officeDocument/2006/relationships" xmlns:p="http://schemas.openxmlformats.org/presentationml/2006/main">
   <p:cSld>
     <p:spTree>

</xml_diff>